<commit_message>
Updated Presentation to v2
</commit_message>
<xml_diff>
--- a/presentation/student_final_project_medical_theme.pptx
+++ b/presentation/student_final_project_medical_theme.pptx
@@ -5,15 +5,16 @@
     <p:sldMasterId id="2147483648" r:id="rId1"/>
   </p:sldMasterIdLst>
   <p:notesMasterIdLst>
-    <p:notesMasterId r:id="rId8"/>
+    <p:notesMasterId r:id="rId9"/>
   </p:notesMasterIdLst>
   <p:sldIdLst>
     <p:sldId id="256" r:id="rId2"/>
     <p:sldId id="257" r:id="rId3"/>
-    <p:sldId id="263" r:id="rId4"/>
-    <p:sldId id="260" r:id="rId5"/>
-    <p:sldId id="261" r:id="rId6"/>
-    <p:sldId id="262" r:id="rId7"/>
+    <p:sldId id="264" r:id="rId4"/>
+    <p:sldId id="263" r:id="rId5"/>
+    <p:sldId id="260" r:id="rId6"/>
+    <p:sldId id="261" r:id="rId7"/>
+    <p:sldId id="262" r:id="rId8"/>
   </p:sldIdLst>
   <p:sldSz cx="9144000" cy="6858000" type="screen4x3"/>
   <p:notesSz cx="6858000" cy="9144000"/>
@@ -916,6 +917,790 @@
 </file>
 
 <file path=ppt/diagrams/colors2.xml><?xml version="1.0" encoding="utf-8"?>
+<dgm:colorsDef xmlns:dgm="http://schemas.openxmlformats.org/drawingml/2006/diagram" xmlns:a="http://schemas.openxmlformats.org/drawingml/2006/main" uniqueId="urn:microsoft.com/office/officeart/2018/5/colors/Iconchunking_neutralbg_colorful5">
+  <dgm:title val=""/>
+  <dgm:desc val=""/>
+  <dgm:catLst>
+    <dgm:cat type="colorful" pri="10500"/>
+  </dgm:catLst>
+  <dgm:styleLbl name="node0">
+    <dgm:fillClrLst meth="repeat">
+      <a:schemeClr val="accent4"/>
+    </dgm:fillClrLst>
+    <dgm:linClrLst meth="repeat">
+      <a:schemeClr val="lt1"/>
+    </dgm:linClrLst>
+    <dgm:effectClrLst/>
+    <dgm:txLinClrLst/>
+    <dgm:txFillClrLst/>
+    <dgm:txEffectClrLst/>
+  </dgm:styleLbl>
+  <dgm:styleLbl name="node1">
+    <dgm:fillClrLst>
+      <a:schemeClr val="accent5"/>
+      <a:schemeClr val="accent6"/>
+    </dgm:fillClrLst>
+    <dgm:linClrLst meth="repeat">
+      <a:schemeClr val="lt1">
+        <a:alpha val="0"/>
+      </a:schemeClr>
+    </dgm:linClrLst>
+    <dgm:effectClrLst/>
+    <dgm:txLinClrLst/>
+    <dgm:txFillClrLst/>
+    <dgm:txEffectClrLst/>
+  </dgm:styleLbl>
+  <dgm:styleLbl name="alignNode1">
+    <dgm:fillClrLst>
+      <a:schemeClr val="accent5"/>
+      <a:schemeClr val="accent6"/>
+    </dgm:fillClrLst>
+    <dgm:linClrLst>
+      <a:schemeClr val="accent5"/>
+      <a:schemeClr val="accent6"/>
+    </dgm:linClrLst>
+    <dgm:effectClrLst/>
+    <dgm:txLinClrLst/>
+    <dgm:txFillClrLst/>
+    <dgm:txEffectClrLst/>
+  </dgm:styleLbl>
+  <dgm:styleLbl name="lnNode1">
+    <dgm:fillClrLst>
+      <a:schemeClr val="accent5"/>
+      <a:schemeClr val="accent6"/>
+    </dgm:fillClrLst>
+    <dgm:linClrLst meth="repeat">
+      <a:schemeClr val="lt1"/>
+    </dgm:linClrLst>
+    <dgm:effectClrLst/>
+    <dgm:txLinClrLst/>
+    <dgm:txFillClrLst/>
+    <dgm:txEffectClrLst/>
+  </dgm:styleLbl>
+  <dgm:styleLbl name="vennNode1">
+    <dgm:fillClrLst>
+      <a:schemeClr val="accent5">
+        <a:alpha val="50000"/>
+      </a:schemeClr>
+      <a:schemeClr val="accent6">
+        <a:alpha val="50000"/>
+      </a:schemeClr>
+    </dgm:fillClrLst>
+    <dgm:linClrLst meth="repeat">
+      <a:schemeClr val="lt1"/>
+    </dgm:linClrLst>
+    <dgm:effectClrLst/>
+    <dgm:txLinClrLst/>
+    <dgm:txFillClrLst/>
+    <dgm:txEffectClrLst/>
+  </dgm:styleLbl>
+  <dgm:styleLbl name="node2">
+    <dgm:fillClrLst>
+      <a:schemeClr val="accent6"/>
+    </dgm:fillClrLst>
+    <dgm:linClrLst meth="repeat">
+      <a:schemeClr val="lt1"/>
+    </dgm:linClrLst>
+    <dgm:effectClrLst/>
+    <dgm:txLinClrLst/>
+    <dgm:txFillClrLst/>
+    <dgm:txEffectClrLst/>
+  </dgm:styleLbl>
+  <dgm:styleLbl name="node3">
+    <dgm:fillClrLst>
+      <a:schemeClr val="accent1"/>
+    </dgm:fillClrLst>
+    <dgm:linClrLst meth="repeat">
+      <a:schemeClr val="lt1"/>
+    </dgm:linClrLst>
+    <dgm:effectClrLst/>
+    <dgm:txLinClrLst/>
+    <dgm:txFillClrLst/>
+    <dgm:txEffectClrLst/>
+  </dgm:styleLbl>
+  <dgm:styleLbl name="node4">
+    <dgm:fillClrLst>
+      <a:schemeClr val="accent2"/>
+    </dgm:fillClrLst>
+    <dgm:linClrLst meth="repeat">
+      <a:schemeClr val="lt1"/>
+    </dgm:linClrLst>
+    <dgm:effectClrLst/>
+    <dgm:txLinClrLst/>
+    <dgm:txFillClrLst/>
+    <dgm:txEffectClrLst/>
+  </dgm:styleLbl>
+  <dgm:styleLbl name="fgImgPlace1">
+    <dgm:fillClrLst>
+      <a:schemeClr val="accent5">
+        <a:tint val="50000"/>
+      </a:schemeClr>
+      <a:schemeClr val="accent6">
+        <a:tint val="50000"/>
+      </a:schemeClr>
+    </dgm:fillClrLst>
+    <dgm:linClrLst meth="repeat">
+      <a:schemeClr val="lt1"/>
+    </dgm:linClrLst>
+    <dgm:effectClrLst/>
+    <dgm:txLinClrLst/>
+    <dgm:txFillClrLst meth="repeat">
+      <a:schemeClr val="lt1"/>
+    </dgm:txFillClrLst>
+    <dgm:txEffectClrLst/>
+  </dgm:styleLbl>
+  <dgm:styleLbl name="alignImgPlace1">
+    <dgm:fillClrLst>
+      <a:schemeClr val="accent5">
+        <a:tint val="50000"/>
+      </a:schemeClr>
+      <a:schemeClr val="accent6">
+        <a:tint val="20000"/>
+      </a:schemeClr>
+    </dgm:fillClrLst>
+    <dgm:linClrLst meth="repeat">
+      <a:schemeClr val="lt1"/>
+    </dgm:linClrLst>
+    <dgm:effectClrLst/>
+    <dgm:txLinClrLst/>
+    <dgm:txFillClrLst meth="repeat">
+      <a:schemeClr val="lt1"/>
+    </dgm:txFillClrLst>
+    <dgm:txEffectClrLst/>
+  </dgm:styleLbl>
+  <dgm:styleLbl name="bgImgPlace1">
+    <dgm:fillClrLst>
+      <a:schemeClr val="accent5">
+        <a:tint val="50000"/>
+      </a:schemeClr>
+      <a:schemeClr val="accent6">
+        <a:tint val="20000"/>
+      </a:schemeClr>
+    </dgm:fillClrLst>
+    <dgm:linClrLst meth="repeat">
+      <a:schemeClr val="lt1"/>
+    </dgm:linClrLst>
+    <dgm:effectClrLst/>
+    <dgm:txLinClrLst/>
+    <dgm:txFillClrLst meth="repeat">
+      <a:schemeClr val="lt1"/>
+    </dgm:txFillClrLst>
+    <dgm:txEffectClrLst/>
+  </dgm:styleLbl>
+  <dgm:styleLbl name="sibTrans2D1">
+    <dgm:fillClrLst>
+      <a:schemeClr val="accent5"/>
+      <a:schemeClr val="accent6"/>
+    </dgm:fillClrLst>
+    <dgm:linClrLst meth="repeat">
+      <a:schemeClr val="lt1"/>
+    </dgm:linClrLst>
+    <dgm:effectClrLst/>
+    <dgm:txLinClrLst/>
+    <dgm:txFillClrLst/>
+    <dgm:txEffectClrLst/>
+  </dgm:styleLbl>
+  <dgm:styleLbl name="fgSibTrans2D1">
+    <dgm:fillClrLst>
+      <a:schemeClr val="accent5"/>
+      <a:schemeClr val="accent6"/>
+    </dgm:fillClrLst>
+    <dgm:linClrLst meth="repeat">
+      <a:schemeClr val="lt1"/>
+    </dgm:linClrLst>
+    <dgm:effectClrLst/>
+    <dgm:txLinClrLst/>
+    <dgm:txFillClrLst meth="repeat">
+      <a:schemeClr val="lt1"/>
+    </dgm:txFillClrLst>
+    <dgm:txEffectClrLst/>
+  </dgm:styleLbl>
+  <dgm:styleLbl name="bgSibTrans2D1">
+    <dgm:fillClrLst>
+      <a:schemeClr val="accent5"/>
+      <a:schemeClr val="accent6"/>
+    </dgm:fillClrLst>
+    <dgm:linClrLst meth="repeat">
+      <a:schemeClr val="lt1"/>
+    </dgm:linClrLst>
+    <dgm:effectClrLst/>
+    <dgm:txLinClrLst/>
+    <dgm:txFillClrLst meth="repeat">
+      <a:schemeClr val="lt1"/>
+    </dgm:txFillClrLst>
+    <dgm:txEffectClrLst/>
+  </dgm:styleLbl>
+  <dgm:styleLbl name="sibTrans1D1">
+    <dgm:fillClrLst/>
+    <dgm:linClrLst>
+      <a:schemeClr val="accent5"/>
+      <a:schemeClr val="accent6"/>
+    </dgm:linClrLst>
+    <dgm:effectClrLst/>
+    <dgm:txLinClrLst/>
+    <dgm:txFillClrLst meth="repeat">
+      <a:schemeClr val="tx1"/>
+    </dgm:txFillClrLst>
+    <dgm:txEffectClrLst/>
+  </dgm:styleLbl>
+  <dgm:styleLbl name="callout">
+    <dgm:fillClrLst meth="repeat">
+      <a:schemeClr val="accent5"/>
+    </dgm:fillClrLst>
+    <dgm:linClrLst meth="repeat">
+      <a:schemeClr val="accent5">
+        <a:tint val="50000"/>
+      </a:schemeClr>
+    </dgm:linClrLst>
+    <dgm:effectClrLst/>
+    <dgm:txLinClrLst/>
+    <dgm:txFillClrLst meth="repeat">
+      <a:schemeClr val="tx1"/>
+    </dgm:txFillClrLst>
+    <dgm:txEffectClrLst/>
+  </dgm:styleLbl>
+  <dgm:styleLbl name="asst0">
+    <dgm:fillClrLst meth="repeat">
+      <a:schemeClr val="accent5"/>
+    </dgm:fillClrLst>
+    <dgm:linClrLst meth="repeat">
+      <a:schemeClr val="lt1">
+        <a:shade val="80000"/>
+      </a:schemeClr>
+    </dgm:linClrLst>
+    <dgm:effectClrLst/>
+    <dgm:txLinClrLst/>
+    <dgm:txFillClrLst/>
+    <dgm:txEffectClrLst/>
+  </dgm:styleLbl>
+  <dgm:styleLbl name="asst1">
+    <dgm:fillClrLst meth="repeat">
+      <a:schemeClr val="accent6"/>
+    </dgm:fillClrLst>
+    <dgm:linClrLst meth="repeat">
+      <a:schemeClr val="lt1">
+        <a:shade val="80000"/>
+      </a:schemeClr>
+    </dgm:linClrLst>
+    <dgm:effectClrLst/>
+    <dgm:txLinClrLst/>
+    <dgm:txFillClrLst/>
+    <dgm:txEffectClrLst/>
+  </dgm:styleLbl>
+  <dgm:styleLbl name="asst2">
+    <dgm:fillClrLst>
+      <a:schemeClr val="accent1"/>
+    </dgm:fillClrLst>
+    <dgm:linClrLst meth="repeat">
+      <a:schemeClr val="lt1"/>
+    </dgm:linClrLst>
+    <dgm:effectClrLst/>
+    <dgm:txLinClrLst/>
+    <dgm:txFillClrLst/>
+    <dgm:txEffectClrLst/>
+  </dgm:styleLbl>
+  <dgm:styleLbl name="asst3">
+    <dgm:fillClrLst>
+      <a:schemeClr val="accent2"/>
+    </dgm:fillClrLst>
+    <dgm:linClrLst meth="repeat">
+      <a:schemeClr val="lt1"/>
+    </dgm:linClrLst>
+    <dgm:effectClrLst/>
+    <dgm:txLinClrLst/>
+    <dgm:txFillClrLst/>
+    <dgm:txEffectClrLst/>
+  </dgm:styleLbl>
+  <dgm:styleLbl name="asst4">
+    <dgm:fillClrLst>
+      <a:schemeClr val="accent3"/>
+    </dgm:fillClrLst>
+    <dgm:linClrLst meth="repeat">
+      <a:schemeClr val="lt1"/>
+    </dgm:linClrLst>
+    <dgm:effectClrLst/>
+    <dgm:txLinClrLst/>
+    <dgm:txFillClrLst/>
+    <dgm:txEffectClrLst/>
+  </dgm:styleLbl>
+  <dgm:styleLbl name="parChTrans2D1">
+    <dgm:fillClrLst meth="repeat">
+      <a:schemeClr val="accent5"/>
+    </dgm:fillClrLst>
+    <dgm:linClrLst meth="repeat">
+      <a:schemeClr val="lt1"/>
+    </dgm:linClrLst>
+    <dgm:effectClrLst/>
+    <dgm:txLinClrLst/>
+    <dgm:txFillClrLst meth="repeat">
+      <a:schemeClr val="lt1"/>
+    </dgm:txFillClrLst>
+    <dgm:txEffectClrLst/>
+  </dgm:styleLbl>
+  <dgm:styleLbl name="parChTrans2D2">
+    <dgm:fillClrLst meth="repeat">
+      <a:schemeClr val="accent6"/>
+    </dgm:fillClrLst>
+    <dgm:linClrLst meth="repeat">
+      <a:schemeClr val="lt1"/>
+    </dgm:linClrLst>
+    <dgm:effectClrLst/>
+    <dgm:txLinClrLst/>
+    <dgm:txFillClrLst/>
+    <dgm:txEffectClrLst/>
+  </dgm:styleLbl>
+  <dgm:styleLbl name="parChTrans2D3">
+    <dgm:fillClrLst meth="repeat">
+      <a:schemeClr val="accent6"/>
+    </dgm:fillClrLst>
+    <dgm:linClrLst meth="repeat">
+      <a:schemeClr val="lt1"/>
+    </dgm:linClrLst>
+    <dgm:effectClrLst/>
+    <dgm:txLinClrLst/>
+    <dgm:txFillClrLst/>
+    <dgm:txEffectClrLst/>
+  </dgm:styleLbl>
+  <dgm:styleLbl name="parChTrans2D4">
+    <dgm:fillClrLst meth="repeat">
+      <a:schemeClr val="accent1"/>
+    </dgm:fillClrLst>
+    <dgm:linClrLst meth="repeat">
+      <a:schemeClr val="lt1"/>
+    </dgm:linClrLst>
+    <dgm:effectClrLst/>
+    <dgm:txLinClrLst/>
+    <dgm:txFillClrLst meth="repeat">
+      <a:schemeClr val="lt1"/>
+    </dgm:txFillClrLst>
+    <dgm:txEffectClrLst/>
+  </dgm:styleLbl>
+  <dgm:styleLbl name="parChTrans1D1">
+    <dgm:fillClrLst meth="repeat">
+      <a:schemeClr val="accent5"/>
+    </dgm:fillClrLst>
+    <dgm:linClrLst meth="repeat">
+      <a:schemeClr val="accent5"/>
+    </dgm:linClrLst>
+    <dgm:effectClrLst/>
+    <dgm:txLinClrLst/>
+    <dgm:txFillClrLst meth="repeat">
+      <a:schemeClr val="tx1"/>
+    </dgm:txFillClrLst>
+    <dgm:txEffectClrLst/>
+  </dgm:styleLbl>
+  <dgm:styleLbl name="parChTrans1D2">
+    <dgm:fillClrLst meth="repeat">
+      <a:schemeClr val="accent6">
+        <a:tint val="90000"/>
+      </a:schemeClr>
+    </dgm:fillClrLst>
+    <dgm:linClrLst meth="repeat">
+      <a:schemeClr val="accent6"/>
+    </dgm:linClrLst>
+    <dgm:effectClrLst/>
+    <dgm:txLinClrLst/>
+    <dgm:txFillClrLst meth="repeat">
+      <a:schemeClr val="tx1"/>
+    </dgm:txFillClrLst>
+    <dgm:txEffectClrLst/>
+  </dgm:styleLbl>
+  <dgm:styleLbl name="parChTrans1D3">
+    <dgm:fillClrLst meth="repeat">
+      <a:schemeClr val="accent6">
+        <a:tint val="70000"/>
+      </a:schemeClr>
+    </dgm:fillClrLst>
+    <dgm:linClrLst meth="repeat">
+      <a:schemeClr val="accent1"/>
+    </dgm:linClrLst>
+    <dgm:effectClrLst/>
+    <dgm:txLinClrLst/>
+    <dgm:txFillClrLst meth="repeat">
+      <a:schemeClr val="tx1"/>
+    </dgm:txFillClrLst>
+    <dgm:txEffectClrLst/>
+  </dgm:styleLbl>
+  <dgm:styleLbl name="parChTrans1D4">
+    <dgm:fillClrLst meth="repeat">
+      <a:schemeClr val="accent6">
+        <a:tint val="50000"/>
+      </a:schemeClr>
+    </dgm:fillClrLst>
+    <dgm:linClrLst meth="repeat">
+      <a:schemeClr val="accent2"/>
+    </dgm:linClrLst>
+    <dgm:effectClrLst/>
+    <dgm:txLinClrLst/>
+    <dgm:txFillClrLst meth="repeat">
+      <a:schemeClr val="tx1"/>
+    </dgm:txFillClrLst>
+    <dgm:txEffectClrLst/>
+  </dgm:styleLbl>
+  <dgm:styleLbl name="fgAcc1">
+    <dgm:fillClrLst meth="repeat">
+      <a:schemeClr val="lt1">
+        <a:alpha val="90000"/>
+      </a:schemeClr>
+    </dgm:fillClrLst>
+    <dgm:linClrLst>
+      <a:schemeClr val="accent5"/>
+      <a:schemeClr val="accent6"/>
+    </dgm:linClrLst>
+    <dgm:effectClrLst/>
+    <dgm:txLinClrLst/>
+    <dgm:txFillClrLst meth="repeat">
+      <a:schemeClr val="dk1"/>
+    </dgm:txFillClrLst>
+    <dgm:txEffectClrLst/>
+  </dgm:styleLbl>
+  <dgm:styleLbl name="conFgAcc1">
+    <dgm:fillClrLst meth="repeat">
+      <a:schemeClr val="lt1">
+        <a:alpha val="90000"/>
+      </a:schemeClr>
+    </dgm:fillClrLst>
+    <dgm:linClrLst>
+      <a:schemeClr val="accent5"/>
+      <a:schemeClr val="accent6"/>
+    </dgm:linClrLst>
+    <dgm:effectClrLst/>
+    <dgm:txLinClrLst/>
+    <dgm:txFillClrLst meth="repeat">
+      <a:schemeClr val="dk1"/>
+    </dgm:txFillClrLst>
+    <dgm:txEffectClrLst/>
+  </dgm:styleLbl>
+  <dgm:styleLbl name="alignAcc1">
+    <dgm:fillClrLst meth="repeat">
+      <a:schemeClr val="lt1">
+        <a:alpha val="90000"/>
+      </a:schemeClr>
+    </dgm:fillClrLst>
+    <dgm:linClrLst>
+      <a:schemeClr val="accent5"/>
+      <a:schemeClr val="accent6"/>
+    </dgm:linClrLst>
+    <dgm:effectClrLst/>
+    <dgm:txLinClrLst/>
+    <dgm:txFillClrLst meth="repeat">
+      <a:schemeClr val="dk1"/>
+    </dgm:txFillClrLst>
+    <dgm:txEffectClrLst/>
+  </dgm:styleLbl>
+  <dgm:styleLbl name="trAlignAcc1">
+    <dgm:fillClrLst meth="repeat">
+      <a:schemeClr val="lt1">
+        <a:alpha val="40000"/>
+      </a:schemeClr>
+    </dgm:fillClrLst>
+    <dgm:linClrLst meth="repeat">
+      <a:schemeClr val="accent5"/>
+    </dgm:linClrLst>
+    <dgm:effectClrLst/>
+    <dgm:txLinClrLst/>
+    <dgm:txFillClrLst meth="repeat">
+      <a:schemeClr val="dk1"/>
+    </dgm:txFillClrLst>
+    <dgm:txEffectClrLst/>
+  </dgm:styleLbl>
+  <dgm:styleLbl name="bgAcc1">
+    <dgm:fillClrLst meth="repeat">
+      <a:schemeClr val="lt1">
+        <a:alpha val="90000"/>
+      </a:schemeClr>
+    </dgm:fillClrLst>
+    <dgm:linClrLst>
+      <a:schemeClr val="accent5"/>
+      <a:schemeClr val="accent6"/>
+    </dgm:linClrLst>
+    <dgm:effectClrLst/>
+    <dgm:txLinClrLst/>
+    <dgm:txFillClrLst meth="repeat">
+      <a:schemeClr val="dk1"/>
+    </dgm:txFillClrLst>
+    <dgm:txEffectClrLst/>
+  </dgm:styleLbl>
+  <dgm:styleLbl name="solidFgAcc1">
+    <dgm:fillClrLst meth="repeat">
+      <a:schemeClr val="lt1"/>
+    </dgm:fillClrLst>
+    <dgm:linClrLst>
+      <a:schemeClr val="accent5"/>
+      <a:schemeClr val="accent6"/>
+    </dgm:linClrLst>
+    <dgm:effectClrLst/>
+    <dgm:txLinClrLst/>
+    <dgm:txFillClrLst meth="repeat">
+      <a:schemeClr val="dk1"/>
+    </dgm:txFillClrLst>
+    <dgm:txEffectClrLst/>
+  </dgm:styleLbl>
+  <dgm:styleLbl name="solidAlignAcc1">
+    <dgm:fillClrLst meth="repeat">
+      <a:schemeClr val="lt1"/>
+    </dgm:fillClrLst>
+    <dgm:linClrLst>
+      <a:schemeClr val="accent5"/>
+      <a:schemeClr val="accent6"/>
+    </dgm:linClrLst>
+    <dgm:effectClrLst/>
+    <dgm:txLinClrLst/>
+    <dgm:txFillClrLst meth="repeat">
+      <a:schemeClr val="dk1"/>
+    </dgm:txFillClrLst>
+    <dgm:txEffectClrLst/>
+  </dgm:styleLbl>
+  <dgm:styleLbl name="solidBgAcc1">
+    <dgm:fillClrLst meth="repeat">
+      <a:schemeClr val="lt1"/>
+    </dgm:fillClrLst>
+    <dgm:linClrLst>
+      <a:schemeClr val="accent5"/>
+      <a:schemeClr val="accent6"/>
+    </dgm:linClrLst>
+    <dgm:effectClrLst/>
+    <dgm:txLinClrLst/>
+    <dgm:txFillClrLst meth="repeat">
+      <a:schemeClr val="dk1"/>
+    </dgm:txFillClrLst>
+    <dgm:txEffectClrLst/>
+  </dgm:styleLbl>
+  <dgm:styleLbl name="fgAccFollowNode1">
+    <dgm:fillClrLst>
+      <a:schemeClr val="accent5">
+        <a:tint val="40000"/>
+        <a:alpha val="90000"/>
+      </a:schemeClr>
+      <a:schemeClr val="accent6">
+        <a:tint val="40000"/>
+        <a:alpha val="90000"/>
+      </a:schemeClr>
+    </dgm:fillClrLst>
+    <dgm:linClrLst>
+      <a:schemeClr val="accent5">
+        <a:tint val="40000"/>
+        <a:alpha val="90000"/>
+      </a:schemeClr>
+      <a:schemeClr val="accent5">
+        <a:tint val="40000"/>
+        <a:alpha val="90000"/>
+      </a:schemeClr>
+    </dgm:linClrLst>
+    <dgm:effectClrLst/>
+    <dgm:txLinClrLst/>
+    <dgm:txFillClrLst meth="repeat">
+      <a:schemeClr val="dk1"/>
+    </dgm:txFillClrLst>
+    <dgm:txEffectClrLst/>
+  </dgm:styleLbl>
+  <dgm:styleLbl name="alignAccFollowNode1">
+    <dgm:fillClrLst>
+      <a:schemeClr val="accent5">
+        <a:tint val="40000"/>
+        <a:alpha val="90000"/>
+      </a:schemeClr>
+      <a:schemeClr val="accent6">
+        <a:tint val="40000"/>
+        <a:alpha val="90000"/>
+      </a:schemeClr>
+    </dgm:fillClrLst>
+    <dgm:linClrLst>
+      <a:schemeClr val="accent5">
+        <a:tint val="40000"/>
+        <a:alpha val="90000"/>
+      </a:schemeClr>
+      <a:schemeClr val="accent6">
+        <a:tint val="40000"/>
+        <a:alpha val="90000"/>
+      </a:schemeClr>
+    </dgm:linClrLst>
+    <dgm:effectClrLst/>
+    <dgm:txLinClrLst/>
+    <dgm:txFillClrLst meth="repeat">
+      <a:schemeClr val="dk1"/>
+    </dgm:txFillClrLst>
+    <dgm:txEffectClrLst/>
+  </dgm:styleLbl>
+  <dgm:styleLbl name="bgAccFollowNode1">
+    <dgm:fillClrLst>
+      <a:schemeClr val="accent5">
+        <a:tint val="40000"/>
+        <a:alpha val="90000"/>
+      </a:schemeClr>
+      <a:schemeClr val="accent6">
+        <a:tint val="40000"/>
+        <a:alpha val="90000"/>
+      </a:schemeClr>
+    </dgm:fillClrLst>
+    <dgm:linClrLst>
+      <a:schemeClr val="accent5">
+        <a:tint val="40000"/>
+        <a:alpha val="90000"/>
+      </a:schemeClr>
+      <a:schemeClr val="accent6">
+        <a:tint val="40000"/>
+        <a:alpha val="90000"/>
+      </a:schemeClr>
+    </dgm:linClrLst>
+    <dgm:effectClrLst/>
+    <dgm:txLinClrLst/>
+    <dgm:txFillClrLst meth="repeat">
+      <a:schemeClr val="dk1"/>
+    </dgm:txFillClrLst>
+    <dgm:txEffectClrLst/>
+  </dgm:styleLbl>
+  <dgm:styleLbl name="fgAcc0">
+    <dgm:fillClrLst meth="repeat">
+      <a:schemeClr val="lt1">
+        <a:alpha val="90000"/>
+      </a:schemeClr>
+    </dgm:fillClrLst>
+    <dgm:linClrLst>
+      <a:schemeClr val="accent4"/>
+    </dgm:linClrLst>
+    <dgm:effectClrLst/>
+    <dgm:txLinClrLst/>
+    <dgm:txFillClrLst meth="repeat">
+      <a:schemeClr val="dk1"/>
+    </dgm:txFillClrLst>
+    <dgm:txEffectClrLst/>
+  </dgm:styleLbl>
+  <dgm:styleLbl name="fgAcc2">
+    <dgm:fillClrLst meth="repeat">
+      <a:schemeClr val="lt1">
+        <a:alpha val="90000"/>
+      </a:schemeClr>
+    </dgm:fillClrLst>
+    <dgm:linClrLst>
+      <a:schemeClr val="accent6"/>
+    </dgm:linClrLst>
+    <dgm:effectClrLst/>
+    <dgm:txLinClrLst/>
+    <dgm:txFillClrLst meth="repeat">
+      <a:schemeClr val="dk1"/>
+    </dgm:txFillClrLst>
+    <dgm:txEffectClrLst/>
+  </dgm:styleLbl>
+  <dgm:styleLbl name="fgAcc3">
+    <dgm:fillClrLst meth="repeat">
+      <a:schemeClr val="lt1">
+        <a:alpha val="90000"/>
+      </a:schemeClr>
+    </dgm:fillClrLst>
+    <dgm:linClrLst>
+      <a:schemeClr val="accent1"/>
+    </dgm:linClrLst>
+    <dgm:effectClrLst/>
+    <dgm:txLinClrLst/>
+    <dgm:txFillClrLst meth="repeat">
+      <a:schemeClr val="dk1"/>
+    </dgm:txFillClrLst>
+    <dgm:txEffectClrLst/>
+  </dgm:styleLbl>
+  <dgm:styleLbl name="fgAcc4">
+    <dgm:fillClrLst meth="repeat">
+      <a:schemeClr val="lt1">
+        <a:alpha val="90000"/>
+      </a:schemeClr>
+    </dgm:fillClrLst>
+    <dgm:linClrLst>
+      <a:schemeClr val="accent2"/>
+    </dgm:linClrLst>
+    <dgm:effectClrLst/>
+    <dgm:txLinClrLst/>
+    <dgm:txFillClrLst meth="repeat">
+      <a:schemeClr val="dk1"/>
+    </dgm:txFillClrLst>
+    <dgm:txEffectClrLst/>
+  </dgm:styleLbl>
+  <dgm:styleLbl name="bgShp">
+    <dgm:fillClrLst meth="repeat">
+      <a:schemeClr val="bg1">
+        <a:lumMod val="95000"/>
+      </a:schemeClr>
+    </dgm:fillClrLst>
+    <dgm:linClrLst meth="repeat">
+      <a:schemeClr val="dk1"/>
+    </dgm:linClrLst>
+    <dgm:effectClrLst/>
+    <dgm:txLinClrLst/>
+    <dgm:txFillClrLst meth="repeat">
+      <a:schemeClr val="dk1"/>
+    </dgm:txFillClrLst>
+    <dgm:txEffectClrLst/>
+  </dgm:styleLbl>
+  <dgm:styleLbl name="dkBgShp">
+    <dgm:fillClrLst meth="repeat">
+      <a:schemeClr val="accent5">
+        <a:shade val="90000"/>
+      </a:schemeClr>
+    </dgm:fillClrLst>
+    <dgm:linClrLst meth="repeat">
+      <a:schemeClr val="dk1"/>
+    </dgm:linClrLst>
+    <dgm:effectClrLst/>
+    <dgm:txLinClrLst/>
+    <dgm:txFillClrLst meth="repeat">
+      <a:schemeClr val="lt1"/>
+    </dgm:txFillClrLst>
+    <dgm:txEffectClrLst/>
+  </dgm:styleLbl>
+  <dgm:styleLbl name="trBgShp">
+    <dgm:fillClrLst meth="repeat">
+      <a:schemeClr val="accent5">
+        <a:tint val="50000"/>
+        <a:alpha val="40000"/>
+      </a:schemeClr>
+    </dgm:fillClrLst>
+    <dgm:linClrLst meth="repeat">
+      <a:schemeClr val="accent5"/>
+    </dgm:linClrLst>
+    <dgm:effectClrLst/>
+    <dgm:txLinClrLst/>
+    <dgm:txFillClrLst meth="repeat">
+      <a:schemeClr val="lt1"/>
+    </dgm:txFillClrLst>
+    <dgm:txEffectClrLst/>
+  </dgm:styleLbl>
+  <dgm:styleLbl name="fgShp">
+    <dgm:fillClrLst meth="repeat">
+      <a:schemeClr val="accent5">
+        <a:tint val="40000"/>
+      </a:schemeClr>
+    </dgm:fillClrLst>
+    <dgm:linClrLst meth="repeat">
+      <a:schemeClr val="lt1"/>
+    </dgm:linClrLst>
+    <dgm:effectClrLst/>
+    <dgm:txLinClrLst/>
+    <dgm:txFillClrLst meth="repeat">
+      <a:schemeClr val="dk1"/>
+    </dgm:txFillClrLst>
+    <dgm:txEffectClrLst/>
+  </dgm:styleLbl>
+  <dgm:styleLbl name="revTx">
+    <dgm:fillClrLst meth="repeat">
+      <a:schemeClr val="lt1">
+        <a:alpha val="0"/>
+      </a:schemeClr>
+    </dgm:fillClrLst>
+    <dgm:linClrLst meth="repeat">
+      <a:schemeClr val="dk1">
+        <a:alpha val="0"/>
+      </a:schemeClr>
+    </dgm:linClrLst>
+    <dgm:effectClrLst/>
+    <dgm:txLinClrLst/>
+    <dgm:txFillClrLst meth="repeat">
+      <a:schemeClr val="tx1"/>
+    </dgm:txFillClrLst>
+    <dgm:txEffectClrLst/>
+  </dgm:styleLbl>
+</dgm:colorsDef>
+</file>
+
+<file path=ppt/diagrams/colors3.xml><?xml version="1.0" encoding="utf-8"?>
 <dgm:colorsDef xmlns:dgm="http://schemas.openxmlformats.org/drawingml/2006/diagram" xmlns:a="http://schemas.openxmlformats.org/drawingml/2006/main" uniqueId="urn:microsoft.com/office/officeart/2018/5/colors/Iconchunking_neutralbg_accent1_2">
   <dgm:title val=""/>
   <dgm:desc val=""/>
@@ -1665,6 +2450,304 @@
 </file>
 
 <file path=ppt/diagrams/data1.xml><?xml version="1.0" encoding="utf-8"?>
+<dgm:dataModel xmlns:dgm="http://schemas.openxmlformats.org/drawingml/2006/diagram" xmlns:a="http://schemas.openxmlformats.org/drawingml/2006/main">
+  <dgm:ptLst>
+    <dgm:pt modelId="{CA582B6C-A846-4ADA-8795-5E5B8C2E9E04}" type="doc">
+      <dgm:prSet loTypeId="urn:microsoft.com/office/officeart/2018/2/layout/IconLabelList" loCatId="icon" qsTypeId="urn:microsoft.com/office/officeart/2005/8/quickstyle/simple1" qsCatId="simple" csTypeId="urn:microsoft.com/office/officeart/2018/5/colors/Iconchunking_neutralbg_colorful5" csCatId="colorful" phldr="1"/>
+      <dgm:spPr/>
+      <dgm:t>
+        <a:bodyPr/>
+        <a:lstStyle/>
+        <a:p>
+          <a:endParaRPr lang="en-US"/>
+        </a:p>
+      </dgm:t>
+    </dgm:pt>
+    <dgm:pt modelId="{73562F0B-5EBF-4A5A-8502-D4A82A6C72F7}">
+      <dgm:prSet/>
+      <dgm:spPr/>
+      <dgm:t>
+        <a:bodyPr/>
+        <a:lstStyle/>
+        <a:p>
+          <a:pPr>
+            <a:lnSpc>
+              <a:spcPct val="100000"/>
+            </a:lnSpc>
+          </a:pPr>
+          <a:r>
+            <a:rPr lang="en-AU" dirty="0"/>
+            <a:t>Testing</a:t>
+          </a:r>
+        </a:p>
+      </dgm:t>
+    </dgm:pt>
+    <dgm:pt modelId="{B10B5A38-B95C-44D2-AACE-B987EFC32691}" type="parTrans" cxnId="{1FF08C83-9F10-40B8-8AD2-6F6EABAC2843}">
+      <dgm:prSet/>
+      <dgm:spPr/>
+      <dgm:t>
+        <a:bodyPr/>
+        <a:lstStyle/>
+        <a:p>
+          <a:endParaRPr lang="en-AU"/>
+        </a:p>
+      </dgm:t>
+    </dgm:pt>
+    <dgm:pt modelId="{129271AA-714D-4008-997D-6F20E4944263}" type="sibTrans" cxnId="{1FF08C83-9F10-40B8-8AD2-6F6EABAC2843}">
+      <dgm:prSet/>
+      <dgm:spPr/>
+      <dgm:t>
+        <a:bodyPr/>
+        <a:lstStyle/>
+        <a:p>
+          <a:endParaRPr lang="en-AU"/>
+        </a:p>
+      </dgm:t>
+    </dgm:pt>
+    <dgm:pt modelId="{B192A17F-F0C5-48AB-B7B2-4AB3ACD7E2B8}">
+      <dgm:prSet/>
+      <dgm:spPr/>
+      <dgm:t>
+        <a:bodyPr/>
+        <a:lstStyle/>
+        <a:p>
+          <a:pPr>
+            <a:lnSpc>
+              <a:spcPct val="100000"/>
+            </a:lnSpc>
+          </a:pPr>
+          <a:r>
+            <a:rPr lang="en-AU" dirty="0"/>
+            <a:t>Demonstration</a:t>
+          </a:r>
+        </a:p>
+      </dgm:t>
+    </dgm:pt>
+    <dgm:pt modelId="{F0BE8FB4-0D82-4714-95BA-D66971843E93}" type="parTrans" cxnId="{079B9644-AC02-4979-85B7-50400F1B1755}">
+      <dgm:prSet/>
+      <dgm:spPr/>
+      <dgm:t>
+        <a:bodyPr/>
+        <a:lstStyle/>
+        <a:p>
+          <a:endParaRPr lang="en-AU"/>
+        </a:p>
+      </dgm:t>
+    </dgm:pt>
+    <dgm:pt modelId="{D2EC1B9D-4387-4DC9-AE04-D1EF3A9BF241}" type="sibTrans" cxnId="{079B9644-AC02-4979-85B7-50400F1B1755}">
+      <dgm:prSet/>
+      <dgm:spPr/>
+      <dgm:t>
+        <a:bodyPr/>
+        <a:lstStyle/>
+        <a:p>
+          <a:endParaRPr lang="en-AU"/>
+        </a:p>
+      </dgm:t>
+    </dgm:pt>
+    <dgm:pt modelId="{79D08B86-D124-40E3-AF8B-E95C34053335}">
+      <dgm:prSet/>
+      <dgm:spPr/>
+      <dgm:t>
+        <a:bodyPr/>
+        <a:lstStyle/>
+        <a:p>
+          <a:pPr>
+            <a:lnSpc>
+              <a:spcPct val="100000"/>
+            </a:lnSpc>
+          </a:pPr>
+          <a:r>
+            <a:rPr lang="en-AU" dirty="0"/>
+            <a:t>Privacy</a:t>
+          </a:r>
+        </a:p>
+      </dgm:t>
+    </dgm:pt>
+    <dgm:pt modelId="{6A7ED97F-4832-44B7-8C7F-EFDB339961BB}" type="parTrans" cxnId="{3984094B-4ED6-413F-AAC1-99708FC153E9}">
+      <dgm:prSet/>
+      <dgm:spPr/>
+      <dgm:t>
+        <a:bodyPr/>
+        <a:lstStyle/>
+        <a:p>
+          <a:endParaRPr lang="en-AU"/>
+        </a:p>
+      </dgm:t>
+    </dgm:pt>
+    <dgm:pt modelId="{E0ADEC22-8524-4036-B7AF-E0D02BB7F71E}" type="sibTrans" cxnId="{3984094B-4ED6-413F-AAC1-99708FC153E9}">
+      <dgm:prSet/>
+      <dgm:spPr/>
+      <dgm:t>
+        <a:bodyPr/>
+        <a:lstStyle/>
+        <a:p>
+          <a:endParaRPr lang="en-AU"/>
+        </a:p>
+      </dgm:t>
+    </dgm:pt>
+    <dgm:pt modelId="{71E53B7D-A12F-46D5-926B-6C815E36B6C1}" type="pres">
+      <dgm:prSet presAssocID="{CA582B6C-A846-4ADA-8795-5E5B8C2E9E04}" presName="root" presStyleCnt="0">
+        <dgm:presLayoutVars>
+          <dgm:dir/>
+          <dgm:resizeHandles val="exact"/>
+        </dgm:presLayoutVars>
+      </dgm:prSet>
+      <dgm:spPr/>
+    </dgm:pt>
+    <dgm:pt modelId="{91A136C9-E1B6-4578-815B-B46385C34EFC}" type="pres">
+      <dgm:prSet presAssocID="{73562F0B-5EBF-4A5A-8502-D4A82A6C72F7}" presName="compNode" presStyleCnt="0"/>
+      <dgm:spPr/>
+    </dgm:pt>
+    <dgm:pt modelId="{743177FC-DB45-4EE5-BB45-2B14E0C6500E}" type="pres">
+      <dgm:prSet presAssocID="{73562F0B-5EBF-4A5A-8502-D4A82A6C72F7}" presName="iconRect" presStyleLbl="node1" presStyleIdx="0" presStyleCnt="3"/>
+      <dgm:spPr>
+        <a:blipFill>
+          <a:blip xmlns:r="http://schemas.openxmlformats.org/officeDocument/2006/relationships" r:embed="rId1">
+            <a:extLst>
+              <a:ext uri="{96DAC541-7B7A-43D3-8B79-37D633B846F1}">
+                <asvg:svgBlip xmlns:asvg="http://schemas.microsoft.com/office/drawing/2016/SVG/main" r:embed="rId2"/>
+              </a:ext>
+            </a:extLst>
+          </a:blip>
+          <a:srcRect/>
+          <a:stretch>
+            <a:fillRect/>
+          </a:stretch>
+        </a:blipFill>
+      </dgm:spPr>
+      <dgm:extLst>
+        <a:ext uri="{E40237B7-FDA0-4F09-8148-C483321AD2D9}">
+          <dgm14:cNvPr xmlns:dgm14="http://schemas.microsoft.com/office/drawing/2010/diagram" id="0" name="" descr="Clipboard Mixed with solid fill"/>
+        </a:ext>
+      </dgm:extLst>
+    </dgm:pt>
+    <dgm:pt modelId="{A974EB07-7E49-48DB-B466-EE2DBE02C903}" type="pres">
+      <dgm:prSet presAssocID="{73562F0B-5EBF-4A5A-8502-D4A82A6C72F7}" presName="spaceRect" presStyleCnt="0"/>
+      <dgm:spPr/>
+    </dgm:pt>
+    <dgm:pt modelId="{F9223D96-A1CD-4647-835F-DAA61000F6CC}" type="pres">
+      <dgm:prSet presAssocID="{73562F0B-5EBF-4A5A-8502-D4A82A6C72F7}" presName="textRect" presStyleLbl="revTx" presStyleIdx="0" presStyleCnt="3">
+        <dgm:presLayoutVars>
+          <dgm:chMax val="1"/>
+          <dgm:chPref val="1"/>
+        </dgm:presLayoutVars>
+      </dgm:prSet>
+      <dgm:spPr/>
+    </dgm:pt>
+    <dgm:pt modelId="{EAA9D1F4-36C7-43AB-9DEC-0FFE70BFB382}" type="pres">
+      <dgm:prSet presAssocID="{129271AA-714D-4008-997D-6F20E4944263}" presName="sibTrans" presStyleCnt="0"/>
+      <dgm:spPr/>
+    </dgm:pt>
+    <dgm:pt modelId="{4F87C209-7452-4BA5-8AEF-846061D91C7F}" type="pres">
+      <dgm:prSet presAssocID="{B192A17F-F0C5-48AB-B7B2-4AB3ACD7E2B8}" presName="compNode" presStyleCnt="0"/>
+      <dgm:spPr/>
+    </dgm:pt>
+    <dgm:pt modelId="{9DBA9D5A-501E-4709-94DA-73A542D7A5BD}" type="pres">
+      <dgm:prSet presAssocID="{B192A17F-F0C5-48AB-B7B2-4AB3ACD7E2B8}" presName="iconRect" presStyleLbl="node1" presStyleIdx="1" presStyleCnt="3"/>
+      <dgm:spPr>
+        <a:blipFill>
+          <a:blip xmlns:r="http://schemas.openxmlformats.org/officeDocument/2006/relationships" r:embed="rId3">
+            <a:extLst>
+              <a:ext uri="{28A0092B-C50C-407E-A947-70E740481C1C}">
+                <a14:useLocalDpi xmlns:a14="http://schemas.microsoft.com/office/drawing/2010/main" val="0"/>
+              </a:ext>
+            </a:extLst>
+          </a:blip>
+          <a:srcRect/>
+          <a:stretch>
+            <a:fillRect l="-15000" r="-15000"/>
+          </a:stretch>
+        </a:blipFill>
+      </dgm:spPr>
+    </dgm:pt>
+    <dgm:pt modelId="{87373030-001B-4B60-B54A-54DE77299173}" type="pres">
+      <dgm:prSet presAssocID="{B192A17F-F0C5-48AB-B7B2-4AB3ACD7E2B8}" presName="spaceRect" presStyleCnt="0"/>
+      <dgm:spPr/>
+    </dgm:pt>
+    <dgm:pt modelId="{661EE868-2EB6-49EF-8CE0-E4C66CD38982}" type="pres">
+      <dgm:prSet presAssocID="{B192A17F-F0C5-48AB-B7B2-4AB3ACD7E2B8}" presName="textRect" presStyleLbl="revTx" presStyleIdx="1" presStyleCnt="3">
+        <dgm:presLayoutVars>
+          <dgm:chMax val="1"/>
+          <dgm:chPref val="1"/>
+        </dgm:presLayoutVars>
+      </dgm:prSet>
+      <dgm:spPr/>
+    </dgm:pt>
+    <dgm:pt modelId="{A1049304-22BD-4CE4-A6E9-E07F9315F324}" type="pres">
+      <dgm:prSet presAssocID="{D2EC1B9D-4387-4DC9-AE04-D1EF3A9BF241}" presName="sibTrans" presStyleCnt="0"/>
+      <dgm:spPr/>
+    </dgm:pt>
+    <dgm:pt modelId="{2ED1E292-F3D9-444A-9599-6A707181EC13}" type="pres">
+      <dgm:prSet presAssocID="{79D08B86-D124-40E3-AF8B-E95C34053335}" presName="compNode" presStyleCnt="0"/>
+      <dgm:spPr/>
+    </dgm:pt>
+    <dgm:pt modelId="{C473F28A-D303-40DA-A39D-6F57914633D6}" type="pres">
+      <dgm:prSet presAssocID="{79D08B86-D124-40E3-AF8B-E95C34053335}" presName="iconRect" presStyleLbl="node1" presStyleIdx="2" presStyleCnt="3"/>
+      <dgm:spPr>
+        <a:blipFill>
+          <a:blip xmlns:r="http://schemas.openxmlformats.org/officeDocument/2006/relationships" r:embed="rId4">
+            <a:extLst>
+              <a:ext uri="{837473B0-CC2E-450A-ABE3-18F120FF3D39}">
+                <a1611:picAttrSrcUrl xmlns:a1611="http://schemas.microsoft.com/office/drawing/2016/11/main" r:id="rId5"/>
+              </a:ext>
+            </a:extLst>
+          </a:blip>
+          <a:srcRect/>
+          <a:stretch>
+            <a:fillRect l="-39000" r="-39000"/>
+          </a:stretch>
+        </a:blipFill>
+      </dgm:spPr>
+    </dgm:pt>
+    <dgm:pt modelId="{B660B3A6-BD4C-4C3C-846B-F10B8C12970B}" type="pres">
+      <dgm:prSet presAssocID="{79D08B86-D124-40E3-AF8B-E95C34053335}" presName="spaceRect" presStyleCnt="0"/>
+      <dgm:spPr/>
+    </dgm:pt>
+    <dgm:pt modelId="{045E4040-1887-4B5D-A250-83E47D2F5F19}" type="pres">
+      <dgm:prSet presAssocID="{79D08B86-D124-40E3-AF8B-E95C34053335}" presName="textRect" presStyleLbl="revTx" presStyleIdx="2" presStyleCnt="3">
+        <dgm:presLayoutVars>
+          <dgm:chMax val="1"/>
+          <dgm:chPref val="1"/>
+        </dgm:presLayoutVars>
+      </dgm:prSet>
+      <dgm:spPr/>
+    </dgm:pt>
+  </dgm:ptLst>
+  <dgm:cxnLst>
+    <dgm:cxn modelId="{6A294B06-7589-4778-ABD4-D34B529EC842}" type="presOf" srcId="{79D08B86-D124-40E3-AF8B-E95C34053335}" destId="{045E4040-1887-4B5D-A250-83E47D2F5F19}" srcOrd="0" destOrd="0" presId="urn:microsoft.com/office/officeart/2018/2/layout/IconLabelList"/>
+    <dgm:cxn modelId="{079B9644-AC02-4979-85B7-50400F1B1755}" srcId="{CA582B6C-A846-4ADA-8795-5E5B8C2E9E04}" destId="{B192A17F-F0C5-48AB-B7B2-4AB3ACD7E2B8}" srcOrd="1" destOrd="0" parTransId="{F0BE8FB4-0D82-4714-95BA-D66971843E93}" sibTransId="{D2EC1B9D-4387-4DC9-AE04-D1EF3A9BF241}"/>
+    <dgm:cxn modelId="{3984094B-4ED6-413F-AAC1-99708FC153E9}" srcId="{CA582B6C-A846-4ADA-8795-5E5B8C2E9E04}" destId="{79D08B86-D124-40E3-AF8B-E95C34053335}" srcOrd="2" destOrd="0" parTransId="{6A7ED97F-4832-44B7-8C7F-EFDB339961BB}" sibTransId="{E0ADEC22-8524-4036-B7AF-E0D02BB7F71E}"/>
+    <dgm:cxn modelId="{A2AC4378-6521-4C15-A55E-38A1D2143347}" type="presOf" srcId="{73562F0B-5EBF-4A5A-8502-D4A82A6C72F7}" destId="{F9223D96-A1CD-4647-835F-DAA61000F6CC}" srcOrd="0" destOrd="0" presId="urn:microsoft.com/office/officeart/2018/2/layout/IconLabelList"/>
+    <dgm:cxn modelId="{1FF08C83-9F10-40B8-8AD2-6F6EABAC2843}" srcId="{CA582B6C-A846-4ADA-8795-5E5B8C2E9E04}" destId="{73562F0B-5EBF-4A5A-8502-D4A82A6C72F7}" srcOrd="0" destOrd="0" parTransId="{B10B5A38-B95C-44D2-AACE-B987EFC32691}" sibTransId="{129271AA-714D-4008-997D-6F20E4944263}"/>
+    <dgm:cxn modelId="{A096CCCF-D0DC-422F-B03A-B945963A2C57}" type="presOf" srcId="{CA582B6C-A846-4ADA-8795-5E5B8C2E9E04}" destId="{71E53B7D-A12F-46D5-926B-6C815E36B6C1}" srcOrd="0" destOrd="0" presId="urn:microsoft.com/office/officeart/2018/2/layout/IconLabelList"/>
+    <dgm:cxn modelId="{4D1ED1D5-79CB-4ACE-91A8-99037DE34156}" type="presOf" srcId="{B192A17F-F0C5-48AB-B7B2-4AB3ACD7E2B8}" destId="{661EE868-2EB6-49EF-8CE0-E4C66CD38982}" srcOrd="0" destOrd="0" presId="urn:microsoft.com/office/officeart/2018/2/layout/IconLabelList"/>
+    <dgm:cxn modelId="{943B2EF1-E1D5-4D8D-AB28-36798BBC1CCB}" type="presParOf" srcId="{71E53B7D-A12F-46D5-926B-6C815E36B6C1}" destId="{91A136C9-E1B6-4578-815B-B46385C34EFC}" srcOrd="0" destOrd="0" presId="urn:microsoft.com/office/officeart/2018/2/layout/IconLabelList"/>
+    <dgm:cxn modelId="{95C1473A-3C72-4862-8A6B-EC735D4A962C}" type="presParOf" srcId="{91A136C9-E1B6-4578-815B-B46385C34EFC}" destId="{743177FC-DB45-4EE5-BB45-2B14E0C6500E}" srcOrd="0" destOrd="0" presId="urn:microsoft.com/office/officeart/2018/2/layout/IconLabelList"/>
+    <dgm:cxn modelId="{69149F89-3E25-4CCA-87F9-2D9B52431A2E}" type="presParOf" srcId="{91A136C9-E1B6-4578-815B-B46385C34EFC}" destId="{A974EB07-7E49-48DB-B466-EE2DBE02C903}" srcOrd="1" destOrd="0" presId="urn:microsoft.com/office/officeart/2018/2/layout/IconLabelList"/>
+    <dgm:cxn modelId="{CD818C0E-6723-44FD-840B-52D9168A51BC}" type="presParOf" srcId="{91A136C9-E1B6-4578-815B-B46385C34EFC}" destId="{F9223D96-A1CD-4647-835F-DAA61000F6CC}" srcOrd="2" destOrd="0" presId="urn:microsoft.com/office/officeart/2018/2/layout/IconLabelList"/>
+    <dgm:cxn modelId="{545D626B-5B20-4A87-9ED7-2B755805C835}" type="presParOf" srcId="{71E53B7D-A12F-46D5-926B-6C815E36B6C1}" destId="{EAA9D1F4-36C7-43AB-9DEC-0FFE70BFB382}" srcOrd="1" destOrd="0" presId="urn:microsoft.com/office/officeart/2018/2/layout/IconLabelList"/>
+    <dgm:cxn modelId="{FF67F48D-93AC-4D68-8E21-327178325A9F}" type="presParOf" srcId="{71E53B7D-A12F-46D5-926B-6C815E36B6C1}" destId="{4F87C209-7452-4BA5-8AEF-846061D91C7F}" srcOrd="2" destOrd="0" presId="urn:microsoft.com/office/officeart/2018/2/layout/IconLabelList"/>
+    <dgm:cxn modelId="{792713E1-30E7-4599-A6B7-A908CD2E3FCE}" type="presParOf" srcId="{4F87C209-7452-4BA5-8AEF-846061D91C7F}" destId="{9DBA9D5A-501E-4709-94DA-73A542D7A5BD}" srcOrd="0" destOrd="0" presId="urn:microsoft.com/office/officeart/2018/2/layout/IconLabelList"/>
+    <dgm:cxn modelId="{144A9DB5-1B71-48F7-B89B-6329927F841A}" type="presParOf" srcId="{4F87C209-7452-4BA5-8AEF-846061D91C7F}" destId="{87373030-001B-4B60-B54A-54DE77299173}" srcOrd="1" destOrd="0" presId="urn:microsoft.com/office/officeart/2018/2/layout/IconLabelList"/>
+    <dgm:cxn modelId="{36B378B8-0EB0-41C9-9C77-4ECB8F09D0EA}" type="presParOf" srcId="{4F87C209-7452-4BA5-8AEF-846061D91C7F}" destId="{661EE868-2EB6-49EF-8CE0-E4C66CD38982}" srcOrd="2" destOrd="0" presId="urn:microsoft.com/office/officeart/2018/2/layout/IconLabelList"/>
+    <dgm:cxn modelId="{48A9D8EE-CEC3-4551-B652-466344AA51D1}" type="presParOf" srcId="{71E53B7D-A12F-46D5-926B-6C815E36B6C1}" destId="{A1049304-22BD-4CE4-A6E9-E07F9315F324}" srcOrd="3" destOrd="0" presId="urn:microsoft.com/office/officeart/2018/2/layout/IconLabelList"/>
+    <dgm:cxn modelId="{09D4E650-8F0A-4A25-AD2C-5F695DBBC1E6}" type="presParOf" srcId="{71E53B7D-A12F-46D5-926B-6C815E36B6C1}" destId="{2ED1E292-F3D9-444A-9599-6A707181EC13}" srcOrd="4" destOrd="0" presId="urn:microsoft.com/office/officeart/2018/2/layout/IconLabelList"/>
+    <dgm:cxn modelId="{0F7C1C8F-7936-4915-B517-DF68C5B87DAE}" type="presParOf" srcId="{2ED1E292-F3D9-444A-9599-6A707181EC13}" destId="{C473F28A-D303-40DA-A39D-6F57914633D6}" srcOrd="0" destOrd="0" presId="urn:microsoft.com/office/officeart/2018/2/layout/IconLabelList"/>
+    <dgm:cxn modelId="{7FD3AD53-4CE3-4854-A467-3A5818D7D328}" type="presParOf" srcId="{2ED1E292-F3D9-444A-9599-6A707181EC13}" destId="{B660B3A6-BD4C-4C3C-846B-F10B8C12970B}" srcOrd="1" destOrd="0" presId="urn:microsoft.com/office/officeart/2018/2/layout/IconLabelList"/>
+    <dgm:cxn modelId="{5D631C6D-25D2-45DA-9A67-01BD4EACD347}" type="presParOf" srcId="{2ED1E292-F3D9-444A-9599-6A707181EC13}" destId="{045E4040-1887-4B5D-A250-83E47D2F5F19}" srcOrd="2" destOrd="0" presId="urn:microsoft.com/office/officeart/2018/2/layout/IconLabelList"/>
+  </dgm:cxnLst>
+  <dgm:bg/>
+  <dgm:whole/>
+  <dgm:extLst>
+    <a:ext uri="http://schemas.microsoft.com/office/drawing/2008/diagram">
+      <dsp:dataModelExt xmlns:dsp="http://schemas.microsoft.com/office/drawing/2008/diagram" relId="rId9" minVer="http://schemas.openxmlformats.org/drawingml/2006/diagram"/>
+    </a:ext>
+  </dgm:extLst>
+</dgm:dataModel>
+</file>
+
+<file path=ppt/diagrams/data2.xml><?xml version="1.0" encoding="utf-8"?>
 <dgm:dataModel xmlns:dgm="http://schemas.openxmlformats.org/drawingml/2006/diagram" xmlns:a="http://schemas.openxmlformats.org/drawingml/2006/main">
   <dgm:ptLst>
     <dgm:pt modelId="{CA582B6C-A846-4ADA-8795-5E5B8C2E9E04}" type="doc">
@@ -1960,13 +3043,13 @@
   <dgm:whole/>
   <dgm:extLst>
     <a:ext uri="http://schemas.microsoft.com/office/drawing/2008/diagram">
-      <dsp:dataModelExt xmlns:dsp="http://schemas.microsoft.com/office/drawing/2008/diagram" relId="rId7" minVer="http://schemas.openxmlformats.org/drawingml/2006/diagram"/>
+      <dsp:dataModelExt xmlns:dsp="http://schemas.microsoft.com/office/drawing/2008/diagram" relId="rId9" minVer="http://schemas.openxmlformats.org/drawingml/2006/diagram"/>
     </a:ext>
   </dgm:extLst>
 </dgm:dataModel>
 </file>
 
-<file path=ppt/diagrams/data2.xml><?xml version="1.0" encoding="utf-8"?>
+<file path=ppt/diagrams/data3.xml><?xml version="1.0" encoding="utf-8"?>
 <dgm:dataModel xmlns:dgm="http://schemas.openxmlformats.org/drawingml/2006/diagram" xmlns:a="http://schemas.openxmlformats.org/drawingml/2006/main">
   <dgm:ptLst>
     <dgm:pt modelId="{D4939ACB-9EC0-4F25-BA15-963F8AF2E179}" type="doc">
@@ -2486,13 +3569,370 @@
   <dgm:whole/>
   <dgm:extLst>
     <a:ext uri="http://schemas.microsoft.com/office/drawing/2008/diagram">
-      <dsp:dataModelExt xmlns:dsp="http://schemas.microsoft.com/office/drawing/2008/diagram" relId="rId7" minVer="http://schemas.openxmlformats.org/drawingml/2006/diagram"/>
+      <dsp:dataModelExt xmlns:dsp="http://schemas.microsoft.com/office/drawing/2008/diagram" relId="rId9" minVer="http://schemas.openxmlformats.org/drawingml/2006/diagram"/>
     </a:ext>
   </dgm:extLst>
 </dgm:dataModel>
 </file>
 
 <file path=ppt/diagrams/drawing1.xml><?xml version="1.0" encoding="utf-8"?>
+<dsp:drawing xmlns:dgm="http://schemas.openxmlformats.org/drawingml/2006/diagram" xmlns:dsp="http://schemas.microsoft.com/office/drawing/2008/diagram" xmlns:a="http://schemas.openxmlformats.org/drawingml/2006/main">
+  <dsp:spTree>
+    <dsp:nvGrpSpPr>
+      <dsp:cNvPr id="0" name=""/>
+      <dsp:cNvGrpSpPr/>
+    </dsp:nvGrpSpPr>
+    <dsp:grpSpPr/>
+    <dsp:sp modelId="{743177FC-DB45-4EE5-BB45-2B14E0C6500E}">
+      <dsp:nvSpPr>
+        <dsp:cNvPr id="0" name=""/>
+        <dsp:cNvSpPr/>
+      </dsp:nvSpPr>
+      <dsp:spPr>
+        <a:xfrm>
+          <a:off x="738477" y="1037662"/>
+          <a:ext cx="1079825" cy="1079825"/>
+        </a:xfrm>
+        <a:prstGeom prst="rect">
+          <a:avLst/>
+        </a:prstGeom>
+        <a:blipFill>
+          <a:blip xmlns:r="http://schemas.openxmlformats.org/officeDocument/2006/relationships" r:embed="rId1">
+            <a:extLst>
+              <a:ext uri="{96DAC541-7B7A-43D3-8B79-37D633B846F1}">
+                <asvg:svgBlip xmlns:asvg="http://schemas.microsoft.com/office/drawing/2016/SVG/main" r:embed="rId2"/>
+              </a:ext>
+            </a:extLst>
+          </a:blip>
+          <a:srcRect/>
+          <a:stretch>
+            <a:fillRect/>
+          </a:stretch>
+        </a:blipFill>
+        <a:ln w="25400" cap="flat" cmpd="sng" algn="ctr">
+          <a:solidFill>
+            <a:schemeClr val="lt1">
+              <a:alpha val="0"/>
+              <a:hueOff val="0"/>
+              <a:satOff val="0"/>
+              <a:lumOff val="0"/>
+              <a:alphaOff val="0"/>
+            </a:schemeClr>
+          </a:solidFill>
+          <a:prstDash val="solid"/>
+        </a:ln>
+        <a:effectLst/>
+      </dsp:spPr>
+      <dsp:style>
+        <a:lnRef idx="2">
+          <a:scrgbClr r="0" g="0" b="0"/>
+        </a:lnRef>
+        <a:fillRef idx="1">
+          <a:scrgbClr r="0" g="0" b="0"/>
+        </a:fillRef>
+        <a:effectRef idx="0">
+          <a:scrgbClr r="0" g="0" b="0"/>
+        </a:effectRef>
+        <a:fontRef idx="minor">
+          <a:schemeClr val="lt1"/>
+        </a:fontRef>
+      </dsp:style>
+    </dsp:sp>
+    <dsp:sp modelId="{F9223D96-A1CD-4647-835F-DAA61000F6CC}">
+      <dsp:nvSpPr>
+        <dsp:cNvPr id="0" name=""/>
+        <dsp:cNvSpPr/>
+      </dsp:nvSpPr>
+      <dsp:spPr>
+        <a:xfrm>
+          <a:off x="78583" y="2435142"/>
+          <a:ext cx="2399612" cy="720000"/>
+        </a:xfrm>
+        <a:prstGeom prst="rect">
+          <a:avLst/>
+        </a:prstGeom>
+        <a:noFill/>
+        <a:ln>
+          <a:noFill/>
+        </a:ln>
+        <a:effectLst/>
+      </dsp:spPr>
+      <dsp:style>
+        <a:lnRef idx="0">
+          <a:scrgbClr r="0" g="0" b="0"/>
+        </a:lnRef>
+        <a:fillRef idx="0">
+          <a:scrgbClr r="0" g="0" b="0"/>
+        </a:fillRef>
+        <a:effectRef idx="0">
+          <a:scrgbClr r="0" g="0" b="0"/>
+        </a:effectRef>
+        <a:fontRef idx="minor"/>
+      </dsp:style>
+      <dsp:txBody>
+        <a:bodyPr spcFirstLastPara="0" vert="horz" wrap="square" lIns="0" tIns="0" rIns="0" bIns="0" numCol="1" spcCol="1270" anchor="t" anchorCtr="0">
+          <a:noAutofit/>
+        </a:bodyPr>
+        <a:lstStyle/>
+        <a:p>
+          <a:pPr marL="0" lvl="0" indent="0" algn="ctr" defTabSz="1377950">
+            <a:lnSpc>
+              <a:spcPct val="100000"/>
+            </a:lnSpc>
+            <a:spcBef>
+              <a:spcPct val="0"/>
+            </a:spcBef>
+            <a:spcAft>
+              <a:spcPct val="35000"/>
+            </a:spcAft>
+            <a:buNone/>
+          </a:pPr>
+          <a:r>
+            <a:rPr lang="en-AU" sz="3100" kern="1200" dirty="0"/>
+            <a:t>Testing</a:t>
+          </a:r>
+        </a:p>
+      </dsp:txBody>
+      <dsp:txXfrm>
+        <a:off x="78583" y="2435142"/>
+        <a:ext cx="2399612" cy="720000"/>
+      </dsp:txXfrm>
+    </dsp:sp>
+    <dsp:sp modelId="{9DBA9D5A-501E-4709-94DA-73A542D7A5BD}">
+      <dsp:nvSpPr>
+        <dsp:cNvPr id="0" name=""/>
+        <dsp:cNvSpPr/>
+      </dsp:nvSpPr>
+      <dsp:spPr>
+        <a:xfrm>
+          <a:off x="3558022" y="1037662"/>
+          <a:ext cx="1079825" cy="1079825"/>
+        </a:xfrm>
+        <a:prstGeom prst="rect">
+          <a:avLst/>
+        </a:prstGeom>
+        <a:blipFill>
+          <a:blip xmlns:r="http://schemas.openxmlformats.org/officeDocument/2006/relationships" r:embed="rId3">
+            <a:extLst>
+              <a:ext uri="{28A0092B-C50C-407E-A947-70E740481C1C}">
+                <a14:useLocalDpi xmlns:a14="http://schemas.microsoft.com/office/drawing/2010/main" val="0"/>
+              </a:ext>
+            </a:extLst>
+          </a:blip>
+          <a:srcRect/>
+          <a:stretch>
+            <a:fillRect l="-15000" r="-15000"/>
+          </a:stretch>
+        </a:blipFill>
+        <a:ln w="25400" cap="flat" cmpd="sng" algn="ctr">
+          <a:solidFill>
+            <a:schemeClr val="lt1">
+              <a:alpha val="0"/>
+              <a:hueOff val="0"/>
+              <a:satOff val="0"/>
+              <a:lumOff val="0"/>
+              <a:alphaOff val="0"/>
+            </a:schemeClr>
+          </a:solidFill>
+          <a:prstDash val="solid"/>
+        </a:ln>
+        <a:effectLst/>
+      </dsp:spPr>
+      <dsp:style>
+        <a:lnRef idx="2">
+          <a:scrgbClr r="0" g="0" b="0"/>
+        </a:lnRef>
+        <a:fillRef idx="1">
+          <a:scrgbClr r="0" g="0" b="0"/>
+        </a:fillRef>
+        <a:effectRef idx="0">
+          <a:scrgbClr r="0" g="0" b="0"/>
+        </a:effectRef>
+        <a:fontRef idx="minor">
+          <a:schemeClr val="lt1"/>
+        </a:fontRef>
+      </dsp:style>
+    </dsp:sp>
+    <dsp:sp modelId="{661EE868-2EB6-49EF-8CE0-E4C66CD38982}">
+      <dsp:nvSpPr>
+        <dsp:cNvPr id="0" name=""/>
+        <dsp:cNvSpPr/>
+      </dsp:nvSpPr>
+      <dsp:spPr>
+        <a:xfrm>
+          <a:off x="2898129" y="2435142"/>
+          <a:ext cx="2399612" cy="720000"/>
+        </a:xfrm>
+        <a:prstGeom prst="rect">
+          <a:avLst/>
+        </a:prstGeom>
+        <a:noFill/>
+        <a:ln>
+          <a:noFill/>
+        </a:ln>
+        <a:effectLst/>
+      </dsp:spPr>
+      <dsp:style>
+        <a:lnRef idx="0">
+          <a:scrgbClr r="0" g="0" b="0"/>
+        </a:lnRef>
+        <a:fillRef idx="0">
+          <a:scrgbClr r="0" g="0" b="0"/>
+        </a:fillRef>
+        <a:effectRef idx="0">
+          <a:scrgbClr r="0" g="0" b="0"/>
+        </a:effectRef>
+        <a:fontRef idx="minor"/>
+      </dsp:style>
+      <dsp:txBody>
+        <a:bodyPr spcFirstLastPara="0" vert="horz" wrap="square" lIns="0" tIns="0" rIns="0" bIns="0" numCol="1" spcCol="1270" anchor="t" anchorCtr="0">
+          <a:noAutofit/>
+        </a:bodyPr>
+        <a:lstStyle/>
+        <a:p>
+          <a:pPr marL="0" lvl="0" indent="0" algn="ctr" defTabSz="1377950">
+            <a:lnSpc>
+              <a:spcPct val="100000"/>
+            </a:lnSpc>
+            <a:spcBef>
+              <a:spcPct val="0"/>
+            </a:spcBef>
+            <a:spcAft>
+              <a:spcPct val="35000"/>
+            </a:spcAft>
+            <a:buNone/>
+          </a:pPr>
+          <a:r>
+            <a:rPr lang="en-AU" sz="3100" kern="1200" dirty="0"/>
+            <a:t>Demonstration</a:t>
+          </a:r>
+        </a:p>
+      </dsp:txBody>
+      <dsp:txXfrm>
+        <a:off x="2898129" y="2435142"/>
+        <a:ext cx="2399612" cy="720000"/>
+      </dsp:txXfrm>
+    </dsp:sp>
+    <dsp:sp modelId="{C473F28A-D303-40DA-A39D-6F57914633D6}">
+      <dsp:nvSpPr>
+        <dsp:cNvPr id="0" name=""/>
+        <dsp:cNvSpPr/>
+      </dsp:nvSpPr>
+      <dsp:spPr>
+        <a:xfrm>
+          <a:off x="6377567" y="1037662"/>
+          <a:ext cx="1079825" cy="1079825"/>
+        </a:xfrm>
+        <a:prstGeom prst="rect">
+          <a:avLst/>
+        </a:prstGeom>
+        <a:blipFill>
+          <a:blip xmlns:r="http://schemas.openxmlformats.org/officeDocument/2006/relationships" r:embed="rId4">
+            <a:extLst>
+              <a:ext uri="{837473B0-CC2E-450A-ABE3-18F120FF3D39}">
+                <a1611:picAttrSrcUrl xmlns:a1611="http://schemas.microsoft.com/office/drawing/2016/11/main" r:id="rId5"/>
+              </a:ext>
+            </a:extLst>
+          </a:blip>
+          <a:srcRect/>
+          <a:stretch>
+            <a:fillRect l="-39000" r="-39000"/>
+          </a:stretch>
+        </a:blipFill>
+        <a:ln w="25400" cap="flat" cmpd="sng" algn="ctr">
+          <a:solidFill>
+            <a:schemeClr val="lt1">
+              <a:alpha val="0"/>
+              <a:hueOff val="0"/>
+              <a:satOff val="0"/>
+              <a:lumOff val="0"/>
+              <a:alphaOff val="0"/>
+            </a:schemeClr>
+          </a:solidFill>
+          <a:prstDash val="solid"/>
+        </a:ln>
+        <a:effectLst/>
+      </dsp:spPr>
+      <dsp:style>
+        <a:lnRef idx="2">
+          <a:scrgbClr r="0" g="0" b="0"/>
+        </a:lnRef>
+        <a:fillRef idx="1">
+          <a:scrgbClr r="0" g="0" b="0"/>
+        </a:fillRef>
+        <a:effectRef idx="0">
+          <a:scrgbClr r="0" g="0" b="0"/>
+        </a:effectRef>
+        <a:fontRef idx="minor">
+          <a:schemeClr val="lt1"/>
+        </a:fontRef>
+      </dsp:style>
+    </dsp:sp>
+    <dsp:sp modelId="{045E4040-1887-4B5D-A250-83E47D2F5F19}">
+      <dsp:nvSpPr>
+        <dsp:cNvPr id="0" name=""/>
+        <dsp:cNvSpPr/>
+      </dsp:nvSpPr>
+      <dsp:spPr>
+        <a:xfrm>
+          <a:off x="5717674" y="2435142"/>
+          <a:ext cx="2399612" cy="720000"/>
+        </a:xfrm>
+        <a:prstGeom prst="rect">
+          <a:avLst/>
+        </a:prstGeom>
+        <a:noFill/>
+        <a:ln>
+          <a:noFill/>
+        </a:ln>
+        <a:effectLst/>
+      </dsp:spPr>
+      <dsp:style>
+        <a:lnRef idx="0">
+          <a:scrgbClr r="0" g="0" b="0"/>
+        </a:lnRef>
+        <a:fillRef idx="0">
+          <a:scrgbClr r="0" g="0" b="0"/>
+        </a:fillRef>
+        <a:effectRef idx="0">
+          <a:scrgbClr r="0" g="0" b="0"/>
+        </a:effectRef>
+        <a:fontRef idx="minor"/>
+      </dsp:style>
+      <dsp:txBody>
+        <a:bodyPr spcFirstLastPara="0" vert="horz" wrap="square" lIns="0" tIns="0" rIns="0" bIns="0" numCol="1" spcCol="1270" anchor="t" anchorCtr="0">
+          <a:noAutofit/>
+        </a:bodyPr>
+        <a:lstStyle/>
+        <a:p>
+          <a:pPr marL="0" lvl="0" indent="0" algn="ctr" defTabSz="1377950">
+            <a:lnSpc>
+              <a:spcPct val="100000"/>
+            </a:lnSpc>
+            <a:spcBef>
+              <a:spcPct val="0"/>
+            </a:spcBef>
+            <a:spcAft>
+              <a:spcPct val="35000"/>
+            </a:spcAft>
+            <a:buNone/>
+          </a:pPr>
+          <a:r>
+            <a:rPr lang="en-AU" sz="3100" kern="1200" dirty="0"/>
+            <a:t>Privacy</a:t>
+          </a:r>
+        </a:p>
+      </dsp:txBody>
+      <dsp:txXfrm>
+        <a:off x="5717674" y="2435142"/>
+        <a:ext cx="2399612" cy="720000"/>
+      </dsp:txXfrm>
+    </dsp:sp>
+  </dsp:spTree>
+</dsp:drawing>
+</file>
+
+<file path=ppt/diagrams/drawing2.xml><?xml version="1.0" encoding="utf-8"?>
 <dsp:drawing xmlns:dgm="http://schemas.openxmlformats.org/drawingml/2006/diagram" xmlns:dsp="http://schemas.microsoft.com/office/drawing/2008/diagram" xmlns:a="http://schemas.openxmlformats.org/drawingml/2006/main">
   <dsp:spTree>
     <dsp:nvGrpSpPr>
@@ -2825,7 +4265,7 @@
 </dsp:drawing>
 </file>
 
-<file path=ppt/diagrams/drawing2.xml><?xml version="1.0" encoding="utf-8"?>
+<file path=ppt/diagrams/drawing3.xml><?xml version="1.0" encoding="utf-8"?>
 <dsp:drawing xmlns:dgm="http://schemas.openxmlformats.org/drawingml/2006/diagram" xmlns:dsp="http://schemas.microsoft.com/office/drawing/2008/diagram" xmlns:a="http://schemas.openxmlformats.org/drawingml/2006/main">
   <dsp:spTree>
     <dsp:nvGrpSpPr>
@@ -3772,6 +5212,196 @@
 </file>
 
 <file path=ppt/diagrams/layout2.xml><?xml version="1.0" encoding="utf-8"?>
+<dgm:layoutDef xmlns:dgm="http://schemas.openxmlformats.org/drawingml/2006/diagram" xmlns:a="http://schemas.openxmlformats.org/drawingml/2006/main" uniqueId="urn:microsoft.com/office/officeart/2018/2/layout/IconLabelList">
+  <dgm:title val="Icon Label List"/>
+  <dgm:desc val="Use to show non-sequential or grouped chunks of information accompanied by a related visuals. Works best with icons or small pictures with short text captions."/>
+  <dgm:catLst>
+    <dgm:cat type="icon" pri="500"/>
+  </dgm:catLst>
+  <dgm:sampData useDef="1">
+    <dgm:dataModel>
+      <dgm:ptLst/>
+      <dgm:bg/>
+      <dgm:whole/>
+    </dgm:dataModel>
+  </dgm:sampData>
+  <dgm:styleData useDef="1">
+    <dgm:dataModel>
+      <dgm:ptLst/>
+      <dgm:bg/>
+      <dgm:whole/>
+    </dgm:dataModel>
+  </dgm:styleData>
+  <dgm:clrData useDef="1">
+    <dgm:dataModel>
+      <dgm:ptLst/>
+      <dgm:bg/>
+      <dgm:whole/>
+    </dgm:dataModel>
+  </dgm:clrData>
+  <dgm:layoutNode name="root">
+    <dgm:varLst>
+      <dgm:dir/>
+      <dgm:resizeHandles val="exact"/>
+    </dgm:varLst>
+    <dgm:choose name="Name0">
+      <dgm:if name="Name1" axis="self" func="var" arg="dir" op="equ" val="norm">
+        <dgm:alg type="snake">
+          <dgm:param type="grDir" val="tL"/>
+          <dgm:param type="flowDir" val="row"/>
+          <dgm:param type="contDir" val="sameDir"/>
+          <dgm:param type="off" val="ctr"/>
+          <dgm:param type="vertAlign" val="mid"/>
+          <dgm:param type="horzAlign" val="ctr"/>
+        </dgm:alg>
+      </dgm:if>
+      <dgm:else name="Name2">
+        <dgm:alg type="snake">
+          <dgm:param type="grDir" val="tR"/>
+          <dgm:param type="flowDir" val="row"/>
+          <dgm:param type="contDir" val="sameDir"/>
+          <dgm:param type="off" val="ctr"/>
+          <dgm:param type="vertAlign" val="mid"/>
+          <dgm:param type="horzAlign" val="ctr"/>
+        </dgm:alg>
+      </dgm:else>
+    </dgm:choose>
+    <dgm:shape xmlns:r="http://schemas.openxmlformats.org/officeDocument/2006/relationships" r:blip="">
+      <dgm:adjLst/>
+    </dgm:shape>
+    <dgm:presOf/>
+    <dgm:choose name="Name3">
+      <dgm:if name="Name4" axis="ch" ptType="node" func="cnt" op="lte" val="2">
+        <dgm:constrLst>
+          <dgm:constr type="h" for="ch" forName="compNode" refType="h" fact="0.4"/>
+          <dgm:constr type="w" for="ch" forName="compNode" val="120"/>
+          <dgm:constr type="w" for="ch" forName="sibTrans" refType="w" refFor="ch" refForName="compNode" fact="0.175"/>
+          <dgm:constr type="sp" refType="w" refFor="ch" refForName="compNode" op="equ" fact="0.25"/>
+          <dgm:constr type="primFontSz" for="des" ptType="node" op="equ" val="50"/>
+          <dgm:constr type="h" for="des" forName="compNode" op="equ"/>
+          <dgm:constr type="h" for="des" forName="textRect" op="equ"/>
+        </dgm:constrLst>
+      </dgm:if>
+      <dgm:if name="Name5" axis="ch" ptType="node" func="cnt" op="lte" val="4">
+        <dgm:constrLst>
+          <dgm:constr type="h" for="ch" forName="compNode" refType="h" fact="0.4"/>
+          <dgm:constr type="w" for="ch" forName="compNode" refType="w"/>
+          <dgm:constr type="w" for="ch" forName="sibTrans" refType="w" refFor="ch" refForName="compNode" fact="0.175"/>
+          <dgm:constr type="sp" refType="w" refFor="ch" refForName="compNode" op="equ" fact="0.25"/>
+          <dgm:constr type="primFontSz" for="des" ptType="node" op="equ" val="36"/>
+          <dgm:constr type="h" for="des" forName="compNode" op="equ"/>
+          <dgm:constr type="h" for="des" forName="textRect" op="equ"/>
+        </dgm:constrLst>
+      </dgm:if>
+      <dgm:else name="Name6">
+        <dgm:constrLst>
+          <dgm:constr type="h" for="ch" forName="compNode" refType="h" fact="0.4"/>
+          <dgm:constr type="w" for="ch" forName="compNode" refType="w"/>
+          <dgm:constr type="w" for="ch" forName="sibTrans" refType="w" refFor="ch" refForName="compNode" fact="0.175"/>
+          <dgm:constr type="sp" refType="w" refFor="ch" refForName="compNode" op="equ" fact="0.25"/>
+          <dgm:constr type="primFontSz" for="des" ptType="node" op="equ" val="24"/>
+          <dgm:constr type="h" for="des" forName="compNode" op="equ"/>
+          <dgm:constr type="h" for="des" forName="textRect" op="equ"/>
+        </dgm:constrLst>
+      </dgm:else>
+    </dgm:choose>
+    <dgm:ruleLst>
+      <dgm:rule type="w" for="ch" forName="compNode" val="50" fact="NaN" max="NaN"/>
+    </dgm:ruleLst>
+    <dgm:forEach name="Name7" axis="ch" ptType="node">
+      <dgm:layoutNode name="compNode">
+        <dgm:alg type="composite"/>
+        <dgm:shape xmlns:r="http://schemas.openxmlformats.org/officeDocument/2006/relationships" r:blip="">
+          <dgm:adjLst/>
+        </dgm:shape>
+        <dgm:presOf axis="self"/>
+        <dgm:constrLst>
+          <dgm:constr type="w" for="ch" forName="iconRect" refType="w" fact="0.45"/>
+          <dgm:constr type="h" for="ch" forName="iconRect" refType="w" refFor="ch" refForName="iconRect"/>
+          <dgm:constr type="ctrX" for="ch" forName="iconRect" refType="w" fact="0.5"/>
+          <dgm:constr type="t" for="ch" forName="iconRect"/>
+          <dgm:constr type="h" for="ch" forName="spaceRect" refType="h" fact="0.15"/>
+          <dgm:constr type="w" for="ch" forName="spaceRect" refType="w"/>
+          <dgm:constr type="l" for="ch" forName="spaceRect"/>
+          <dgm:constr type="t" for="ch" forName="spaceRect" refType="b" refFor="ch" refForName="iconRect"/>
+          <dgm:constr type="h" for="ch" forName="textRect" val="20"/>
+          <dgm:constr type="w" for="ch" forName="textRect" refType="w"/>
+          <dgm:constr type="l" for="ch" forName="textRect"/>
+          <dgm:constr type="t" for="ch" forName="textRect" refType="b" refFor="ch" refForName="spaceRect"/>
+        </dgm:constrLst>
+        <dgm:ruleLst>
+          <dgm:rule type="h" val="INF" fact="NaN" max="NaN"/>
+        </dgm:ruleLst>
+        <dgm:layoutNode name="iconRect" styleLbl="node1">
+          <dgm:alg type="sp"/>
+          <dgm:shape xmlns:r="http://schemas.openxmlformats.org/officeDocument/2006/relationships" type="rect" r:blip="" blipPhldr="1">
+            <dgm:adjLst/>
+          </dgm:shape>
+          <dgm:presOf/>
+          <dgm:constrLst/>
+          <dgm:ruleLst/>
+        </dgm:layoutNode>
+        <dgm:layoutNode name="spaceRect">
+          <dgm:alg type="sp"/>
+          <dgm:shape xmlns:r="http://schemas.openxmlformats.org/officeDocument/2006/relationships" r:blip="">
+            <dgm:adjLst/>
+          </dgm:shape>
+          <dgm:presOf/>
+          <dgm:constrLst/>
+          <dgm:ruleLst/>
+        </dgm:layoutNode>
+        <dgm:layoutNode name="textRect" styleLbl="revTx">
+          <dgm:varLst>
+            <dgm:chMax val="1"/>
+            <dgm:chPref val="1"/>
+          </dgm:varLst>
+          <dgm:alg type="tx">
+            <dgm:param type="txAnchorVert" val="t"/>
+          </dgm:alg>
+          <dgm:shape xmlns:r="http://schemas.openxmlformats.org/officeDocument/2006/relationships" type="rect" r:blip="">
+            <dgm:adjLst/>
+          </dgm:shape>
+          <dgm:presOf axis="self" ptType="node"/>
+          <dgm:constrLst>
+            <dgm:constr type="lMarg"/>
+            <dgm:constr type="rMarg"/>
+            <dgm:constr type="tMarg"/>
+            <dgm:constr type="bMarg"/>
+          </dgm:constrLst>
+          <dgm:ruleLst>
+            <dgm:rule type="primFontSz" val="11" fact="NaN" max="NaN"/>
+            <dgm:rule type="h" val="INF" fact="NaN" max="NaN"/>
+          </dgm:ruleLst>
+        </dgm:layoutNode>
+      </dgm:layoutNode>
+      <dgm:forEach name="Name8" axis="followSib" ptType="sibTrans" cnt="1">
+        <dgm:layoutNode name="sibTrans">
+          <dgm:alg type="sp"/>
+          <dgm:shape xmlns:r="http://schemas.openxmlformats.org/officeDocument/2006/relationships" r:blip="">
+            <dgm:adjLst/>
+          </dgm:shape>
+          <dgm:presOf axis="self"/>
+          <dgm:constrLst/>
+          <dgm:ruleLst/>
+        </dgm:layoutNode>
+      </dgm:forEach>
+    </dgm:forEach>
+  </dgm:layoutNode>
+  <dgm:extLst>
+    <a:ext uri="{68A01E43-0DF5-4B5B-8FA6-DAF915123BFB}">
+      <dgm1612:lstStyle xmlns:dgm1612="http://schemas.microsoft.com/office/drawing/2016/12/diagram">
+        <a:lvl1pPr>
+          <a:lnSpc>
+            <a:spcPct val="100000"/>
+          </a:lnSpc>
+        </a:lvl1pPr>
+      </dgm1612:lstStyle>
+    </a:ext>
+  </dgm:extLst>
+</dgm:layoutDef>
+</file>
+
+<file path=ppt/diagrams/layout3.xml><?xml version="1.0" encoding="utf-8"?>
 <dgm:layoutDef xmlns:dgm="http://schemas.openxmlformats.org/drawingml/2006/diagram" xmlns:a="http://schemas.openxmlformats.org/drawingml/2006/main" uniqueId="urn:microsoft.com/office/officeart/2018/5/layout/IconCircleLabelList">
   <dgm:title val="Icon Circle Label List"/>
   <dgm:desc val="Use to show non-sequential or grouped chunks of information accompanied by a related visuals. Works best with icons or small pictures with short text captions."/>
@@ -5021,6 +6651,1040 @@
 </file>
 
 <file path=ppt/diagrams/quickStyle2.xml><?xml version="1.0" encoding="utf-8"?>
+<dgm:styleDef xmlns:dgm="http://schemas.openxmlformats.org/drawingml/2006/diagram" xmlns:a="http://schemas.openxmlformats.org/drawingml/2006/main" uniqueId="urn:microsoft.com/office/officeart/2005/8/quickstyle/simple1">
+  <dgm:title val=""/>
+  <dgm:desc val=""/>
+  <dgm:catLst>
+    <dgm:cat type="simple" pri="10100"/>
+  </dgm:catLst>
+  <dgm:scene3d>
+    <a:camera prst="orthographicFront"/>
+    <a:lightRig rig="threePt" dir="t"/>
+  </dgm:scene3d>
+  <dgm:styleLbl name="node0">
+    <dgm:scene3d>
+      <a:camera prst="orthographicFront"/>
+      <a:lightRig rig="threePt" dir="t"/>
+    </dgm:scene3d>
+    <dgm:sp3d/>
+    <dgm:txPr/>
+    <dgm:style>
+      <a:lnRef idx="2">
+        <a:scrgbClr r="0" g="0" b="0"/>
+      </a:lnRef>
+      <a:fillRef idx="1">
+        <a:scrgbClr r="0" g="0" b="0"/>
+      </a:fillRef>
+      <a:effectRef idx="0">
+        <a:scrgbClr r="0" g="0" b="0"/>
+      </a:effectRef>
+      <a:fontRef idx="minor">
+        <a:schemeClr val="lt1"/>
+      </a:fontRef>
+    </dgm:style>
+  </dgm:styleLbl>
+  <dgm:styleLbl name="lnNode1">
+    <dgm:scene3d>
+      <a:camera prst="orthographicFront"/>
+      <a:lightRig rig="threePt" dir="t"/>
+    </dgm:scene3d>
+    <dgm:sp3d/>
+    <dgm:txPr/>
+    <dgm:style>
+      <a:lnRef idx="2">
+        <a:scrgbClr r="0" g="0" b="0"/>
+      </a:lnRef>
+      <a:fillRef idx="1">
+        <a:scrgbClr r="0" g="0" b="0"/>
+      </a:fillRef>
+      <a:effectRef idx="0">
+        <a:scrgbClr r="0" g="0" b="0"/>
+      </a:effectRef>
+      <a:fontRef idx="minor">
+        <a:schemeClr val="lt1"/>
+      </a:fontRef>
+    </dgm:style>
+  </dgm:styleLbl>
+  <dgm:styleLbl name="vennNode1">
+    <dgm:scene3d>
+      <a:camera prst="orthographicFront"/>
+      <a:lightRig rig="threePt" dir="t"/>
+    </dgm:scene3d>
+    <dgm:sp3d/>
+    <dgm:txPr/>
+    <dgm:style>
+      <a:lnRef idx="2">
+        <a:scrgbClr r="0" g="0" b="0"/>
+      </a:lnRef>
+      <a:fillRef idx="1">
+        <a:scrgbClr r="0" g="0" b="0"/>
+      </a:fillRef>
+      <a:effectRef idx="0">
+        <a:scrgbClr r="0" g="0" b="0"/>
+      </a:effectRef>
+      <a:fontRef idx="minor">
+        <a:schemeClr val="tx1"/>
+      </a:fontRef>
+    </dgm:style>
+  </dgm:styleLbl>
+  <dgm:styleLbl name="alignNode1">
+    <dgm:scene3d>
+      <a:camera prst="orthographicFront"/>
+      <a:lightRig rig="threePt" dir="t"/>
+    </dgm:scene3d>
+    <dgm:sp3d/>
+    <dgm:txPr/>
+    <dgm:style>
+      <a:lnRef idx="2">
+        <a:scrgbClr r="0" g="0" b="0"/>
+      </a:lnRef>
+      <a:fillRef idx="1">
+        <a:scrgbClr r="0" g="0" b="0"/>
+      </a:fillRef>
+      <a:effectRef idx="0">
+        <a:scrgbClr r="0" g="0" b="0"/>
+      </a:effectRef>
+      <a:fontRef idx="minor">
+        <a:schemeClr val="lt1"/>
+      </a:fontRef>
+    </dgm:style>
+  </dgm:styleLbl>
+  <dgm:styleLbl name="node1">
+    <dgm:scene3d>
+      <a:camera prst="orthographicFront"/>
+      <a:lightRig rig="threePt" dir="t"/>
+    </dgm:scene3d>
+    <dgm:sp3d/>
+    <dgm:txPr/>
+    <dgm:style>
+      <a:lnRef idx="2">
+        <a:scrgbClr r="0" g="0" b="0"/>
+      </a:lnRef>
+      <a:fillRef idx="1">
+        <a:scrgbClr r="0" g="0" b="0"/>
+      </a:fillRef>
+      <a:effectRef idx="0">
+        <a:scrgbClr r="0" g="0" b="0"/>
+      </a:effectRef>
+      <a:fontRef idx="minor">
+        <a:schemeClr val="lt1"/>
+      </a:fontRef>
+    </dgm:style>
+  </dgm:styleLbl>
+  <dgm:styleLbl name="node2">
+    <dgm:scene3d>
+      <a:camera prst="orthographicFront"/>
+      <a:lightRig rig="threePt" dir="t"/>
+    </dgm:scene3d>
+    <dgm:sp3d/>
+    <dgm:txPr/>
+    <dgm:style>
+      <a:lnRef idx="2">
+        <a:scrgbClr r="0" g="0" b="0"/>
+      </a:lnRef>
+      <a:fillRef idx="1">
+        <a:scrgbClr r="0" g="0" b="0"/>
+      </a:fillRef>
+      <a:effectRef idx="0">
+        <a:scrgbClr r="0" g="0" b="0"/>
+      </a:effectRef>
+      <a:fontRef idx="minor">
+        <a:schemeClr val="lt1"/>
+      </a:fontRef>
+    </dgm:style>
+  </dgm:styleLbl>
+  <dgm:styleLbl name="node3">
+    <dgm:scene3d>
+      <a:camera prst="orthographicFront"/>
+      <a:lightRig rig="threePt" dir="t"/>
+    </dgm:scene3d>
+    <dgm:sp3d/>
+    <dgm:txPr/>
+    <dgm:style>
+      <a:lnRef idx="2">
+        <a:scrgbClr r="0" g="0" b="0"/>
+      </a:lnRef>
+      <a:fillRef idx="1">
+        <a:scrgbClr r="0" g="0" b="0"/>
+      </a:fillRef>
+      <a:effectRef idx="0">
+        <a:scrgbClr r="0" g="0" b="0"/>
+      </a:effectRef>
+      <a:fontRef idx="minor">
+        <a:schemeClr val="lt1"/>
+      </a:fontRef>
+    </dgm:style>
+  </dgm:styleLbl>
+  <dgm:styleLbl name="node4">
+    <dgm:scene3d>
+      <a:camera prst="orthographicFront"/>
+      <a:lightRig rig="threePt" dir="t"/>
+    </dgm:scene3d>
+    <dgm:sp3d/>
+    <dgm:txPr/>
+    <dgm:style>
+      <a:lnRef idx="2">
+        <a:scrgbClr r="0" g="0" b="0"/>
+      </a:lnRef>
+      <a:fillRef idx="1">
+        <a:scrgbClr r="0" g="0" b="0"/>
+      </a:fillRef>
+      <a:effectRef idx="0">
+        <a:scrgbClr r="0" g="0" b="0"/>
+      </a:effectRef>
+      <a:fontRef idx="minor">
+        <a:schemeClr val="lt1"/>
+      </a:fontRef>
+    </dgm:style>
+  </dgm:styleLbl>
+  <dgm:styleLbl name="fgImgPlace1">
+    <dgm:scene3d>
+      <a:camera prst="orthographicFront"/>
+      <a:lightRig rig="threePt" dir="t"/>
+    </dgm:scene3d>
+    <dgm:sp3d/>
+    <dgm:txPr/>
+    <dgm:style>
+      <a:lnRef idx="2">
+        <a:scrgbClr r="0" g="0" b="0"/>
+      </a:lnRef>
+      <a:fillRef idx="1">
+        <a:scrgbClr r="0" g="0" b="0"/>
+      </a:fillRef>
+      <a:effectRef idx="0">
+        <a:scrgbClr r="0" g="0" b="0"/>
+      </a:effectRef>
+      <a:fontRef idx="minor"/>
+    </dgm:style>
+  </dgm:styleLbl>
+  <dgm:styleLbl name="alignImgPlace1">
+    <dgm:scene3d>
+      <a:camera prst="orthographicFront"/>
+      <a:lightRig rig="threePt" dir="t"/>
+    </dgm:scene3d>
+    <dgm:sp3d/>
+    <dgm:txPr/>
+    <dgm:style>
+      <a:lnRef idx="2">
+        <a:scrgbClr r="0" g="0" b="0"/>
+      </a:lnRef>
+      <a:fillRef idx="1">
+        <a:scrgbClr r="0" g="0" b="0"/>
+      </a:fillRef>
+      <a:effectRef idx="0">
+        <a:scrgbClr r="0" g="0" b="0"/>
+      </a:effectRef>
+      <a:fontRef idx="minor"/>
+    </dgm:style>
+  </dgm:styleLbl>
+  <dgm:styleLbl name="bgImgPlace1">
+    <dgm:scene3d>
+      <a:camera prst="orthographicFront"/>
+      <a:lightRig rig="threePt" dir="t"/>
+    </dgm:scene3d>
+    <dgm:sp3d/>
+    <dgm:txPr/>
+    <dgm:style>
+      <a:lnRef idx="2">
+        <a:scrgbClr r="0" g="0" b="0"/>
+      </a:lnRef>
+      <a:fillRef idx="1">
+        <a:scrgbClr r="0" g="0" b="0"/>
+      </a:fillRef>
+      <a:effectRef idx="0">
+        <a:scrgbClr r="0" g="0" b="0"/>
+      </a:effectRef>
+      <a:fontRef idx="minor"/>
+    </dgm:style>
+  </dgm:styleLbl>
+  <dgm:styleLbl name="sibTrans2D1">
+    <dgm:scene3d>
+      <a:camera prst="orthographicFront"/>
+      <a:lightRig rig="threePt" dir="t"/>
+    </dgm:scene3d>
+    <dgm:sp3d/>
+    <dgm:txPr/>
+    <dgm:style>
+      <a:lnRef idx="0">
+        <a:scrgbClr r="0" g="0" b="0"/>
+      </a:lnRef>
+      <a:fillRef idx="1">
+        <a:scrgbClr r="0" g="0" b="0"/>
+      </a:fillRef>
+      <a:effectRef idx="0">
+        <a:scrgbClr r="0" g="0" b="0"/>
+      </a:effectRef>
+      <a:fontRef idx="minor">
+        <a:schemeClr val="lt1"/>
+      </a:fontRef>
+    </dgm:style>
+  </dgm:styleLbl>
+  <dgm:styleLbl name="fgSibTrans2D1">
+    <dgm:scene3d>
+      <a:camera prst="orthographicFront"/>
+      <a:lightRig rig="threePt" dir="t"/>
+    </dgm:scene3d>
+    <dgm:sp3d/>
+    <dgm:txPr/>
+    <dgm:style>
+      <a:lnRef idx="0">
+        <a:scrgbClr r="0" g="0" b="0"/>
+      </a:lnRef>
+      <a:fillRef idx="1">
+        <a:scrgbClr r="0" g="0" b="0"/>
+      </a:fillRef>
+      <a:effectRef idx="0">
+        <a:scrgbClr r="0" g="0" b="0"/>
+      </a:effectRef>
+      <a:fontRef idx="minor">
+        <a:schemeClr val="lt1"/>
+      </a:fontRef>
+    </dgm:style>
+  </dgm:styleLbl>
+  <dgm:styleLbl name="bgSibTrans2D1">
+    <dgm:scene3d>
+      <a:camera prst="orthographicFront"/>
+      <a:lightRig rig="threePt" dir="t"/>
+    </dgm:scene3d>
+    <dgm:sp3d/>
+    <dgm:txPr/>
+    <dgm:style>
+      <a:lnRef idx="0">
+        <a:scrgbClr r="0" g="0" b="0"/>
+      </a:lnRef>
+      <a:fillRef idx="1">
+        <a:scrgbClr r="0" g="0" b="0"/>
+      </a:fillRef>
+      <a:effectRef idx="0">
+        <a:scrgbClr r="0" g="0" b="0"/>
+      </a:effectRef>
+      <a:fontRef idx="minor">
+        <a:schemeClr val="lt1"/>
+      </a:fontRef>
+    </dgm:style>
+  </dgm:styleLbl>
+  <dgm:styleLbl name="sibTrans1D1">
+    <dgm:scene3d>
+      <a:camera prst="orthographicFront"/>
+      <a:lightRig rig="threePt" dir="t"/>
+    </dgm:scene3d>
+    <dgm:sp3d/>
+    <dgm:txPr/>
+    <dgm:style>
+      <a:lnRef idx="1">
+        <a:scrgbClr r="0" g="0" b="0"/>
+      </a:lnRef>
+      <a:fillRef idx="0">
+        <a:scrgbClr r="0" g="0" b="0"/>
+      </a:fillRef>
+      <a:effectRef idx="0">
+        <a:scrgbClr r="0" g="0" b="0"/>
+      </a:effectRef>
+      <a:fontRef idx="minor"/>
+    </dgm:style>
+  </dgm:styleLbl>
+  <dgm:styleLbl name="callout">
+    <dgm:scene3d>
+      <a:camera prst="orthographicFront"/>
+      <a:lightRig rig="threePt" dir="t"/>
+    </dgm:scene3d>
+    <dgm:sp3d/>
+    <dgm:txPr/>
+    <dgm:style>
+      <a:lnRef idx="2">
+        <a:scrgbClr r="0" g="0" b="0"/>
+      </a:lnRef>
+      <a:fillRef idx="1">
+        <a:scrgbClr r="0" g="0" b="0"/>
+      </a:fillRef>
+      <a:effectRef idx="0">
+        <a:scrgbClr r="0" g="0" b="0"/>
+      </a:effectRef>
+      <a:fontRef idx="minor"/>
+    </dgm:style>
+  </dgm:styleLbl>
+  <dgm:styleLbl name="asst0">
+    <dgm:scene3d>
+      <a:camera prst="orthographicFront"/>
+      <a:lightRig rig="threePt" dir="t"/>
+    </dgm:scene3d>
+    <dgm:sp3d/>
+    <dgm:txPr/>
+    <dgm:style>
+      <a:lnRef idx="2">
+        <a:scrgbClr r="0" g="0" b="0"/>
+      </a:lnRef>
+      <a:fillRef idx="1">
+        <a:scrgbClr r="0" g="0" b="0"/>
+      </a:fillRef>
+      <a:effectRef idx="0">
+        <a:scrgbClr r="0" g="0" b="0"/>
+      </a:effectRef>
+      <a:fontRef idx="minor">
+        <a:schemeClr val="lt1"/>
+      </a:fontRef>
+    </dgm:style>
+  </dgm:styleLbl>
+  <dgm:styleLbl name="asst1">
+    <dgm:scene3d>
+      <a:camera prst="orthographicFront"/>
+      <a:lightRig rig="threePt" dir="t"/>
+    </dgm:scene3d>
+    <dgm:sp3d/>
+    <dgm:txPr/>
+    <dgm:style>
+      <a:lnRef idx="2">
+        <a:scrgbClr r="0" g="0" b="0"/>
+      </a:lnRef>
+      <a:fillRef idx="1">
+        <a:scrgbClr r="0" g="0" b="0"/>
+      </a:fillRef>
+      <a:effectRef idx="0">
+        <a:scrgbClr r="0" g="0" b="0"/>
+      </a:effectRef>
+      <a:fontRef idx="minor">
+        <a:schemeClr val="lt1"/>
+      </a:fontRef>
+    </dgm:style>
+  </dgm:styleLbl>
+  <dgm:styleLbl name="asst2">
+    <dgm:scene3d>
+      <a:camera prst="orthographicFront"/>
+      <a:lightRig rig="threePt" dir="t"/>
+    </dgm:scene3d>
+    <dgm:sp3d/>
+    <dgm:txPr/>
+    <dgm:style>
+      <a:lnRef idx="2">
+        <a:scrgbClr r="0" g="0" b="0"/>
+      </a:lnRef>
+      <a:fillRef idx="1">
+        <a:scrgbClr r="0" g="0" b="0"/>
+      </a:fillRef>
+      <a:effectRef idx="0">
+        <a:scrgbClr r="0" g="0" b="0"/>
+      </a:effectRef>
+      <a:fontRef idx="minor">
+        <a:schemeClr val="lt1"/>
+      </a:fontRef>
+    </dgm:style>
+  </dgm:styleLbl>
+  <dgm:styleLbl name="asst3">
+    <dgm:scene3d>
+      <a:camera prst="orthographicFront"/>
+      <a:lightRig rig="threePt" dir="t"/>
+    </dgm:scene3d>
+    <dgm:sp3d/>
+    <dgm:txPr/>
+    <dgm:style>
+      <a:lnRef idx="2">
+        <a:scrgbClr r="0" g="0" b="0"/>
+      </a:lnRef>
+      <a:fillRef idx="1">
+        <a:scrgbClr r="0" g="0" b="0"/>
+      </a:fillRef>
+      <a:effectRef idx="0">
+        <a:scrgbClr r="0" g="0" b="0"/>
+      </a:effectRef>
+      <a:fontRef idx="minor">
+        <a:schemeClr val="lt1"/>
+      </a:fontRef>
+    </dgm:style>
+  </dgm:styleLbl>
+  <dgm:styleLbl name="asst4">
+    <dgm:scene3d>
+      <a:camera prst="orthographicFront"/>
+      <a:lightRig rig="threePt" dir="t"/>
+    </dgm:scene3d>
+    <dgm:sp3d/>
+    <dgm:txPr/>
+    <dgm:style>
+      <a:lnRef idx="2">
+        <a:scrgbClr r="0" g="0" b="0"/>
+      </a:lnRef>
+      <a:fillRef idx="1">
+        <a:scrgbClr r="0" g="0" b="0"/>
+      </a:fillRef>
+      <a:effectRef idx="0">
+        <a:scrgbClr r="0" g="0" b="0"/>
+      </a:effectRef>
+      <a:fontRef idx="minor">
+        <a:schemeClr val="lt1"/>
+      </a:fontRef>
+    </dgm:style>
+  </dgm:styleLbl>
+  <dgm:styleLbl name="parChTrans2D1">
+    <dgm:scene3d>
+      <a:camera prst="orthographicFront"/>
+      <a:lightRig rig="threePt" dir="t"/>
+    </dgm:scene3d>
+    <dgm:sp3d/>
+    <dgm:txPr/>
+    <dgm:style>
+      <a:lnRef idx="2">
+        <a:scrgbClr r="0" g="0" b="0"/>
+      </a:lnRef>
+      <a:fillRef idx="1">
+        <a:scrgbClr r="0" g="0" b="0"/>
+      </a:fillRef>
+      <a:effectRef idx="0">
+        <a:scrgbClr r="0" g="0" b="0"/>
+      </a:effectRef>
+      <a:fontRef idx="minor">
+        <a:schemeClr val="lt1"/>
+      </a:fontRef>
+    </dgm:style>
+  </dgm:styleLbl>
+  <dgm:styleLbl name="parChTrans2D2">
+    <dgm:scene3d>
+      <a:camera prst="orthographicFront"/>
+      <a:lightRig rig="threePt" dir="t"/>
+    </dgm:scene3d>
+    <dgm:sp3d/>
+    <dgm:txPr/>
+    <dgm:style>
+      <a:lnRef idx="2">
+        <a:scrgbClr r="0" g="0" b="0"/>
+      </a:lnRef>
+      <a:fillRef idx="1">
+        <a:scrgbClr r="0" g="0" b="0"/>
+      </a:fillRef>
+      <a:effectRef idx="0">
+        <a:scrgbClr r="0" g="0" b="0"/>
+      </a:effectRef>
+      <a:fontRef idx="minor">
+        <a:schemeClr val="lt1"/>
+      </a:fontRef>
+    </dgm:style>
+  </dgm:styleLbl>
+  <dgm:styleLbl name="parChTrans2D3">
+    <dgm:scene3d>
+      <a:camera prst="orthographicFront"/>
+      <a:lightRig rig="threePt" dir="t"/>
+    </dgm:scene3d>
+    <dgm:sp3d/>
+    <dgm:txPr/>
+    <dgm:style>
+      <a:lnRef idx="2">
+        <a:scrgbClr r="0" g="0" b="0"/>
+      </a:lnRef>
+      <a:fillRef idx="1">
+        <a:scrgbClr r="0" g="0" b="0"/>
+      </a:fillRef>
+      <a:effectRef idx="0">
+        <a:scrgbClr r="0" g="0" b="0"/>
+      </a:effectRef>
+      <a:fontRef idx="minor">
+        <a:schemeClr val="lt1"/>
+      </a:fontRef>
+    </dgm:style>
+  </dgm:styleLbl>
+  <dgm:styleLbl name="parChTrans2D4">
+    <dgm:scene3d>
+      <a:camera prst="orthographicFront"/>
+      <a:lightRig rig="threePt" dir="t"/>
+    </dgm:scene3d>
+    <dgm:sp3d/>
+    <dgm:txPr/>
+    <dgm:style>
+      <a:lnRef idx="2">
+        <a:scrgbClr r="0" g="0" b="0"/>
+      </a:lnRef>
+      <a:fillRef idx="1">
+        <a:scrgbClr r="0" g="0" b="0"/>
+      </a:fillRef>
+      <a:effectRef idx="0">
+        <a:scrgbClr r="0" g="0" b="0"/>
+      </a:effectRef>
+      <a:fontRef idx="minor">
+        <a:schemeClr val="lt1"/>
+      </a:fontRef>
+    </dgm:style>
+  </dgm:styleLbl>
+  <dgm:styleLbl name="parChTrans1D1">
+    <dgm:scene3d>
+      <a:camera prst="orthographicFront"/>
+      <a:lightRig rig="threePt" dir="t"/>
+    </dgm:scene3d>
+    <dgm:sp3d/>
+    <dgm:txPr/>
+    <dgm:style>
+      <a:lnRef idx="2">
+        <a:scrgbClr r="0" g="0" b="0"/>
+      </a:lnRef>
+      <a:fillRef idx="0">
+        <a:scrgbClr r="0" g="0" b="0"/>
+      </a:fillRef>
+      <a:effectRef idx="0">
+        <a:scrgbClr r="0" g="0" b="0"/>
+      </a:effectRef>
+      <a:fontRef idx="minor"/>
+    </dgm:style>
+  </dgm:styleLbl>
+  <dgm:styleLbl name="parChTrans1D2">
+    <dgm:scene3d>
+      <a:camera prst="orthographicFront"/>
+      <a:lightRig rig="threePt" dir="t"/>
+    </dgm:scene3d>
+    <dgm:sp3d/>
+    <dgm:txPr/>
+    <dgm:style>
+      <a:lnRef idx="2">
+        <a:scrgbClr r="0" g="0" b="0"/>
+      </a:lnRef>
+      <a:fillRef idx="0">
+        <a:scrgbClr r="0" g="0" b="0"/>
+      </a:fillRef>
+      <a:effectRef idx="0">
+        <a:scrgbClr r="0" g="0" b="0"/>
+      </a:effectRef>
+      <a:fontRef idx="minor"/>
+    </dgm:style>
+  </dgm:styleLbl>
+  <dgm:styleLbl name="parChTrans1D3">
+    <dgm:scene3d>
+      <a:camera prst="orthographicFront"/>
+      <a:lightRig rig="threePt" dir="t"/>
+    </dgm:scene3d>
+    <dgm:sp3d/>
+    <dgm:txPr/>
+    <dgm:style>
+      <a:lnRef idx="2">
+        <a:scrgbClr r="0" g="0" b="0"/>
+      </a:lnRef>
+      <a:fillRef idx="0">
+        <a:scrgbClr r="0" g="0" b="0"/>
+      </a:fillRef>
+      <a:effectRef idx="0">
+        <a:scrgbClr r="0" g="0" b="0"/>
+      </a:effectRef>
+      <a:fontRef idx="minor"/>
+    </dgm:style>
+  </dgm:styleLbl>
+  <dgm:styleLbl name="parChTrans1D4">
+    <dgm:scene3d>
+      <a:camera prst="orthographicFront"/>
+      <a:lightRig rig="threePt" dir="t"/>
+    </dgm:scene3d>
+    <dgm:sp3d/>
+    <dgm:txPr/>
+    <dgm:style>
+      <a:lnRef idx="2">
+        <a:scrgbClr r="0" g="0" b="0"/>
+      </a:lnRef>
+      <a:fillRef idx="0">
+        <a:scrgbClr r="0" g="0" b="0"/>
+      </a:fillRef>
+      <a:effectRef idx="0">
+        <a:scrgbClr r="0" g="0" b="0"/>
+      </a:effectRef>
+      <a:fontRef idx="minor"/>
+    </dgm:style>
+  </dgm:styleLbl>
+  <dgm:styleLbl name="fgAcc1">
+    <dgm:scene3d>
+      <a:camera prst="orthographicFront"/>
+      <a:lightRig rig="threePt" dir="t"/>
+    </dgm:scene3d>
+    <dgm:sp3d/>
+    <dgm:txPr/>
+    <dgm:style>
+      <a:lnRef idx="2">
+        <a:scrgbClr r="0" g="0" b="0"/>
+      </a:lnRef>
+      <a:fillRef idx="1">
+        <a:scrgbClr r="0" g="0" b="0"/>
+      </a:fillRef>
+      <a:effectRef idx="0">
+        <a:scrgbClr r="0" g="0" b="0"/>
+      </a:effectRef>
+      <a:fontRef idx="minor"/>
+    </dgm:style>
+  </dgm:styleLbl>
+  <dgm:styleLbl name="conFgAcc1">
+    <dgm:scene3d>
+      <a:camera prst="orthographicFront"/>
+      <a:lightRig rig="threePt" dir="t"/>
+    </dgm:scene3d>
+    <dgm:sp3d/>
+    <dgm:txPr/>
+    <dgm:style>
+      <a:lnRef idx="2">
+        <a:scrgbClr r="0" g="0" b="0"/>
+      </a:lnRef>
+      <a:fillRef idx="1">
+        <a:scrgbClr r="0" g="0" b="0"/>
+      </a:fillRef>
+      <a:effectRef idx="0">
+        <a:scrgbClr r="0" g="0" b="0"/>
+      </a:effectRef>
+      <a:fontRef idx="minor"/>
+    </dgm:style>
+  </dgm:styleLbl>
+  <dgm:styleLbl name="alignAcc1">
+    <dgm:scene3d>
+      <a:camera prst="orthographicFront"/>
+      <a:lightRig rig="threePt" dir="t"/>
+    </dgm:scene3d>
+    <dgm:sp3d/>
+    <dgm:txPr/>
+    <dgm:style>
+      <a:lnRef idx="2">
+        <a:scrgbClr r="0" g="0" b="0"/>
+      </a:lnRef>
+      <a:fillRef idx="1">
+        <a:scrgbClr r="0" g="0" b="0"/>
+      </a:fillRef>
+      <a:effectRef idx="0">
+        <a:scrgbClr r="0" g="0" b="0"/>
+      </a:effectRef>
+      <a:fontRef idx="minor"/>
+    </dgm:style>
+  </dgm:styleLbl>
+  <dgm:styleLbl name="trAlignAcc1">
+    <dgm:scene3d>
+      <a:camera prst="orthographicFront"/>
+      <a:lightRig rig="threePt" dir="t"/>
+    </dgm:scene3d>
+    <dgm:sp3d/>
+    <dgm:txPr/>
+    <dgm:style>
+      <a:lnRef idx="1">
+        <a:scrgbClr r="0" g="0" b="0"/>
+      </a:lnRef>
+      <a:fillRef idx="1">
+        <a:scrgbClr r="0" g="0" b="0"/>
+      </a:fillRef>
+      <a:effectRef idx="0">
+        <a:scrgbClr r="0" g="0" b="0"/>
+      </a:effectRef>
+      <a:fontRef idx="minor"/>
+    </dgm:style>
+  </dgm:styleLbl>
+  <dgm:styleLbl name="bgAcc1">
+    <dgm:scene3d>
+      <a:camera prst="orthographicFront"/>
+      <a:lightRig rig="threePt" dir="t"/>
+    </dgm:scene3d>
+    <dgm:sp3d/>
+    <dgm:txPr/>
+    <dgm:style>
+      <a:lnRef idx="2">
+        <a:scrgbClr r="0" g="0" b="0"/>
+      </a:lnRef>
+      <a:fillRef idx="1">
+        <a:scrgbClr r="0" g="0" b="0"/>
+      </a:fillRef>
+      <a:effectRef idx="0">
+        <a:scrgbClr r="0" g="0" b="0"/>
+      </a:effectRef>
+      <a:fontRef idx="minor"/>
+    </dgm:style>
+  </dgm:styleLbl>
+  <dgm:styleLbl name="solidFgAcc1">
+    <dgm:scene3d>
+      <a:camera prst="orthographicFront"/>
+      <a:lightRig rig="threePt" dir="t"/>
+    </dgm:scene3d>
+    <dgm:sp3d/>
+    <dgm:txPr/>
+    <dgm:style>
+      <a:lnRef idx="2">
+        <a:scrgbClr r="0" g="0" b="0"/>
+      </a:lnRef>
+      <a:fillRef idx="1">
+        <a:scrgbClr r="0" g="0" b="0"/>
+      </a:fillRef>
+      <a:effectRef idx="0">
+        <a:scrgbClr r="0" g="0" b="0"/>
+      </a:effectRef>
+      <a:fontRef idx="minor"/>
+    </dgm:style>
+  </dgm:styleLbl>
+  <dgm:styleLbl name="solidAlignAcc1">
+    <dgm:scene3d>
+      <a:camera prst="orthographicFront"/>
+      <a:lightRig rig="threePt" dir="t"/>
+    </dgm:scene3d>
+    <dgm:sp3d/>
+    <dgm:txPr/>
+    <dgm:style>
+      <a:lnRef idx="2">
+        <a:scrgbClr r="0" g="0" b="0"/>
+      </a:lnRef>
+      <a:fillRef idx="1">
+        <a:scrgbClr r="0" g="0" b="0"/>
+      </a:fillRef>
+      <a:effectRef idx="0">
+        <a:scrgbClr r="0" g="0" b="0"/>
+      </a:effectRef>
+      <a:fontRef idx="minor"/>
+    </dgm:style>
+  </dgm:styleLbl>
+  <dgm:styleLbl name="solidBgAcc1">
+    <dgm:scene3d>
+      <a:camera prst="orthographicFront"/>
+      <a:lightRig rig="threePt" dir="t"/>
+    </dgm:scene3d>
+    <dgm:sp3d/>
+    <dgm:txPr/>
+    <dgm:style>
+      <a:lnRef idx="2">
+        <a:scrgbClr r="0" g="0" b="0"/>
+      </a:lnRef>
+      <a:fillRef idx="1">
+        <a:scrgbClr r="0" g="0" b="0"/>
+      </a:fillRef>
+      <a:effectRef idx="0">
+        <a:scrgbClr r="0" g="0" b="0"/>
+      </a:effectRef>
+      <a:fontRef idx="minor"/>
+    </dgm:style>
+  </dgm:styleLbl>
+  <dgm:styleLbl name="fgAccFollowNode1">
+    <dgm:scene3d>
+      <a:camera prst="orthographicFront"/>
+      <a:lightRig rig="threePt" dir="t"/>
+    </dgm:scene3d>
+    <dgm:sp3d/>
+    <dgm:txPr/>
+    <dgm:style>
+      <a:lnRef idx="2">
+        <a:scrgbClr r="0" g="0" b="0"/>
+      </a:lnRef>
+      <a:fillRef idx="1">
+        <a:scrgbClr r="0" g="0" b="0"/>
+      </a:fillRef>
+      <a:effectRef idx="0">
+        <a:scrgbClr r="0" g="0" b="0"/>
+      </a:effectRef>
+      <a:fontRef idx="minor"/>
+    </dgm:style>
+  </dgm:styleLbl>
+  <dgm:styleLbl name="alignAccFollowNode1">
+    <dgm:scene3d>
+      <a:camera prst="orthographicFront"/>
+      <a:lightRig rig="threePt" dir="t"/>
+    </dgm:scene3d>
+    <dgm:sp3d/>
+    <dgm:txPr/>
+    <dgm:style>
+      <a:lnRef idx="2">
+        <a:scrgbClr r="0" g="0" b="0"/>
+      </a:lnRef>
+      <a:fillRef idx="1">
+        <a:scrgbClr r="0" g="0" b="0"/>
+      </a:fillRef>
+      <a:effectRef idx="0">
+        <a:scrgbClr r="0" g="0" b="0"/>
+      </a:effectRef>
+      <a:fontRef idx="minor"/>
+    </dgm:style>
+  </dgm:styleLbl>
+  <dgm:styleLbl name="bgAccFollowNode1">
+    <dgm:scene3d>
+      <a:camera prst="orthographicFront"/>
+      <a:lightRig rig="threePt" dir="t"/>
+    </dgm:scene3d>
+    <dgm:sp3d/>
+    <dgm:txPr/>
+    <dgm:style>
+      <a:lnRef idx="2">
+        <a:scrgbClr r="0" g="0" b="0"/>
+      </a:lnRef>
+      <a:fillRef idx="1">
+        <a:scrgbClr r="0" g="0" b="0"/>
+      </a:fillRef>
+      <a:effectRef idx="0">
+        <a:scrgbClr r="0" g="0" b="0"/>
+      </a:effectRef>
+      <a:fontRef idx="minor"/>
+    </dgm:style>
+  </dgm:styleLbl>
+  <dgm:styleLbl name="fgAcc0">
+    <dgm:scene3d>
+      <a:camera prst="orthographicFront"/>
+      <a:lightRig rig="threePt" dir="t"/>
+    </dgm:scene3d>
+    <dgm:sp3d/>
+    <dgm:txPr/>
+    <dgm:style>
+      <a:lnRef idx="2">
+        <a:scrgbClr r="0" g="0" b="0"/>
+      </a:lnRef>
+      <a:fillRef idx="1">
+        <a:scrgbClr r="0" g="0" b="0"/>
+      </a:fillRef>
+      <a:effectRef idx="0">
+        <a:scrgbClr r="0" g="0" b="0"/>
+      </a:effectRef>
+      <a:fontRef idx="minor"/>
+    </dgm:style>
+  </dgm:styleLbl>
+  <dgm:styleLbl name="fgAcc2">
+    <dgm:scene3d>
+      <a:camera prst="orthographicFront"/>
+      <a:lightRig rig="threePt" dir="t"/>
+    </dgm:scene3d>
+    <dgm:sp3d/>
+    <dgm:txPr/>
+    <dgm:style>
+      <a:lnRef idx="2">
+        <a:scrgbClr r="0" g="0" b="0"/>
+      </a:lnRef>
+      <a:fillRef idx="1">
+        <a:scrgbClr r="0" g="0" b="0"/>
+      </a:fillRef>
+      <a:effectRef idx="0">
+        <a:scrgbClr r="0" g="0" b="0"/>
+      </a:effectRef>
+      <a:fontRef idx="minor"/>
+    </dgm:style>
+  </dgm:styleLbl>
+  <dgm:styleLbl name="fgAcc3">
+    <dgm:scene3d>
+      <a:camera prst="orthographicFront"/>
+      <a:lightRig rig="threePt" dir="t"/>
+    </dgm:scene3d>
+    <dgm:sp3d/>
+    <dgm:txPr/>
+    <dgm:style>
+      <a:lnRef idx="2">
+        <a:scrgbClr r="0" g="0" b="0"/>
+      </a:lnRef>
+      <a:fillRef idx="1">
+        <a:scrgbClr r="0" g="0" b="0"/>
+      </a:fillRef>
+      <a:effectRef idx="0">
+        <a:scrgbClr r="0" g="0" b="0"/>
+      </a:effectRef>
+      <a:fontRef idx="minor"/>
+    </dgm:style>
+  </dgm:styleLbl>
+  <dgm:styleLbl name="fgAcc4">
+    <dgm:scene3d>
+      <a:camera prst="orthographicFront"/>
+      <a:lightRig rig="threePt" dir="t"/>
+    </dgm:scene3d>
+    <dgm:sp3d/>
+    <dgm:txPr/>
+    <dgm:style>
+      <a:lnRef idx="2">
+        <a:scrgbClr r="0" g="0" b="0"/>
+      </a:lnRef>
+      <a:fillRef idx="1">
+        <a:scrgbClr r="0" g="0" b="0"/>
+      </a:fillRef>
+      <a:effectRef idx="0">
+        <a:scrgbClr r="0" g="0" b="0"/>
+      </a:effectRef>
+      <a:fontRef idx="minor"/>
+    </dgm:style>
+  </dgm:styleLbl>
+  <dgm:styleLbl name="bgShp">
+    <dgm:scene3d>
+      <a:camera prst="orthographicFront"/>
+      <a:lightRig rig="threePt" dir="t"/>
+    </dgm:scene3d>
+    <dgm:sp3d/>
+    <dgm:txPr/>
+    <dgm:style>
+      <a:lnRef idx="0">
+        <a:scrgbClr r="0" g="0" b="0"/>
+      </a:lnRef>
+      <a:fillRef idx="1">
+        <a:scrgbClr r="0" g="0" b="0"/>
+      </a:fillRef>
+      <a:effectRef idx="0">
+        <a:scrgbClr r="0" g="0" b="0"/>
+      </a:effectRef>
+      <a:fontRef idx="minor"/>
+    </dgm:style>
+  </dgm:styleLbl>
+  <dgm:styleLbl name="dkBgShp">
+    <dgm:scene3d>
+      <a:camera prst="orthographicFront"/>
+      <a:lightRig rig="threePt" dir="t"/>
+    </dgm:scene3d>
+    <dgm:sp3d/>
+    <dgm:txPr/>
+    <dgm:style>
+      <a:lnRef idx="0">
+        <a:scrgbClr r="0" g="0" b="0"/>
+      </a:lnRef>
+      <a:fillRef idx="1">
+        <a:scrgbClr r="0" g="0" b="0"/>
+      </a:fillRef>
+      <a:effectRef idx="0">
+        <a:scrgbClr r="0" g="0" b="0"/>
+      </a:effectRef>
+      <a:fontRef idx="minor"/>
+    </dgm:style>
+  </dgm:styleLbl>
+  <dgm:styleLbl name="trBgShp">
+    <dgm:scene3d>
+      <a:camera prst="orthographicFront"/>
+      <a:lightRig rig="threePt" dir="t"/>
+    </dgm:scene3d>
+    <dgm:sp3d/>
+    <dgm:txPr/>
+    <dgm:style>
+      <a:lnRef idx="0">
+        <a:scrgbClr r="0" g="0" b="0"/>
+      </a:lnRef>
+      <a:fillRef idx="1">
+        <a:scrgbClr r="0" g="0" b="0"/>
+      </a:fillRef>
+      <a:effectRef idx="0">
+        <a:scrgbClr r="0" g="0" b="0"/>
+      </a:effectRef>
+      <a:fontRef idx="minor"/>
+    </dgm:style>
+  </dgm:styleLbl>
+  <dgm:styleLbl name="fgShp">
+    <dgm:scene3d>
+      <a:camera prst="orthographicFront"/>
+      <a:lightRig rig="threePt" dir="t"/>
+    </dgm:scene3d>
+    <dgm:sp3d/>
+    <dgm:txPr/>
+    <dgm:style>
+      <a:lnRef idx="2">
+        <a:scrgbClr r="0" g="0" b="0"/>
+      </a:lnRef>
+      <a:fillRef idx="1">
+        <a:scrgbClr r="0" g="0" b="0"/>
+      </a:fillRef>
+      <a:effectRef idx="0">
+        <a:scrgbClr r="0" g="0" b="0"/>
+      </a:effectRef>
+      <a:fontRef idx="minor"/>
+    </dgm:style>
+  </dgm:styleLbl>
+  <dgm:styleLbl name="revTx">
+    <dgm:scene3d>
+      <a:camera prst="orthographicFront"/>
+      <a:lightRig rig="threePt" dir="t"/>
+    </dgm:scene3d>
+    <dgm:sp3d/>
+    <dgm:txPr/>
+    <dgm:style>
+      <a:lnRef idx="0">
+        <a:scrgbClr r="0" g="0" b="0"/>
+      </a:lnRef>
+      <a:fillRef idx="0">
+        <a:scrgbClr r="0" g="0" b="0"/>
+      </a:fillRef>
+      <a:effectRef idx="0">
+        <a:scrgbClr r="0" g="0" b="0"/>
+      </a:effectRef>
+      <a:fontRef idx="minor"/>
+    </dgm:style>
+  </dgm:styleLbl>
+</dgm:styleDef>
+</file>
+
+<file path=ppt/diagrams/quickStyle3.xml><?xml version="1.0" encoding="utf-8"?>
 <dgm:styleDef xmlns:dgm="http://schemas.openxmlformats.org/drawingml/2006/diagram" xmlns:a="http://schemas.openxmlformats.org/drawingml/2006/main" uniqueId="urn:microsoft.com/office/officeart/2005/8/quickstyle/simple1">
   <dgm:title val=""/>
   <dgm:desc val=""/>
@@ -6294,9 +8958,20 @@
           <a:lstStyle/>
           <a:p>
             <a:r>
-              <a:rPr dirty="0"/>
-              <a:t>Explain why synthetic data helps learning without privacy issues.</a:t>
+              <a:rPr lang="en-AU" dirty="0" err="1"/>
+              <a:t>Synthethic</a:t>
             </a:r>
+            <a:r>
+              <a:rPr lang="en-AU" dirty="0"/>
+              <a:t> Medical Data Generation would be useful for Testing, Creating Demonstration while maintaining Patient’s Privacy.</a:t>
+            </a:r>
+          </a:p>
+          <a:p>
+            <a:r>
+              <a:rPr lang="en-AU" dirty="0"/>
+              <a:t>Previously we would need to obtain data from site, which comes with issue with Patient’s Privacy and many approvals process which makes it difficult.</a:t>
+            </a:r>
+            <a:endParaRPr dirty="0"/>
           </a:p>
         </p:txBody>
       </p:sp>
@@ -6321,6 +8996,103 @@
 </file>
 
 <file path=ppt/notesSlides/notesSlide3.xml><?xml version="1.0" encoding="utf-8"?>
+<p:notes xmlns:a="http://schemas.openxmlformats.org/drawingml/2006/main" xmlns:r="http://schemas.openxmlformats.org/officeDocument/2006/relationships" xmlns:p="http://schemas.openxmlformats.org/presentationml/2006/main">
+  <p:cSld>
+    <p:spTree>
+      <p:nvGrpSpPr>
+        <p:cNvPr id="1" name=""/>
+        <p:cNvGrpSpPr/>
+        <p:nvPr/>
+      </p:nvGrpSpPr>
+      <p:grpSpPr>
+        <a:xfrm>
+          <a:off x="0" y="0"/>
+          <a:ext cx="0" cy="0"/>
+          <a:chOff x="0" y="0"/>
+          <a:chExt cx="0" cy="0"/>
+        </a:xfrm>
+      </p:grpSpPr>
+      <p:sp>
+        <p:nvSpPr>
+          <p:cNvPr id="2" name="Slide Image Placeholder 1"/>
+          <p:cNvSpPr>
+            <a:spLocks noGrp="1" noRot="1" noChangeAspect="1"/>
+          </p:cNvSpPr>
+          <p:nvPr>
+            <p:ph type="sldImg" idx="2"/>
+          </p:nvPr>
+        </p:nvSpPr>
+        <p:spPr/>
+      </p:sp>
+      <p:sp>
+        <p:nvSpPr>
+          <p:cNvPr id="3" name="Notes Placeholder 2"/>
+          <p:cNvSpPr>
+            <a:spLocks noGrp="1"/>
+          </p:cNvSpPr>
+          <p:nvPr>
+            <p:ph type="body" sz="quarter" idx="3"/>
+          </p:nvPr>
+        </p:nvSpPr>
+        <p:spPr/>
+        <p:txBody>
+          <a:bodyPr/>
+          <a:lstStyle/>
+          <a:p>
+            <a:r>
+              <a:rPr lang="en-AU" dirty="0"/>
+              <a:t>Project is about creating an AI agent to generate a synthetic medical data based on user prompt.</a:t>
+            </a:r>
+            <a:br>
+              <a:rPr lang="en-AU" dirty="0"/>
+            </a:br>
+            <a:r>
+              <a:rPr lang="en-AU" dirty="0"/>
+              <a:t>AI agent would use RAG based approach on generating the data, equipped with web tools to DuckDuckGo, Wikipedia, PubMed and </a:t>
+            </a:r>
+            <a:r>
+              <a:rPr lang="en-AU" dirty="0" err="1"/>
+              <a:t>Arxciv</a:t>
+            </a:r>
+            <a:r>
+              <a:rPr lang="en-AU" dirty="0"/>
+              <a:t> to be able to gather relevant medical information while creating medical data.</a:t>
+            </a:r>
+          </a:p>
+          <a:p>
+            <a:r>
+              <a:rPr lang="en-AU" dirty="0"/>
+              <a:t>A simple web interface is given for demonstration purposes.</a:t>
+            </a:r>
+          </a:p>
+        </p:txBody>
+      </p:sp>
+      <p:sp>
+        <p:nvSpPr>
+          <p:cNvPr id="4" name="Slide Number Placeholder 3"/>
+          <p:cNvSpPr>
+            <a:spLocks noGrp="1"/>
+          </p:cNvSpPr>
+          <p:nvPr>
+            <p:ph type="sldNum" sz="quarter" idx="5"/>
+          </p:nvPr>
+        </p:nvSpPr>
+        <p:spPr/>
+      </p:sp>
+    </p:spTree>
+    <p:extLst>
+      <p:ext uri="{BB962C8B-B14F-4D97-AF65-F5344CB8AC3E}">
+        <p14:creationId xmlns:p14="http://schemas.microsoft.com/office/powerpoint/2010/main" val="2401778952"/>
+      </p:ext>
+    </p:extLst>
+  </p:cSld>
+  <p:clrMapOvr>
+    <a:masterClrMapping/>
+  </p:clrMapOvr>
+</p:notes>
+</file>
+
+<file path=ppt/notesSlides/notesSlide4.xml><?xml version="1.0" encoding="utf-8"?>
 <p:notes xmlns:a="http://schemas.openxmlformats.org/drawingml/2006/main" xmlns:r="http://schemas.openxmlformats.org/officeDocument/2006/relationships" xmlns:p="http://schemas.openxmlformats.org/presentationml/2006/main">
   <p:cSld>
     <p:spTree>
@@ -6383,9 +9155,10 @@
           <a:lstStyle/>
           <a:p>
             <a:r>
-              <a:rPr dirty="0"/>
-              <a:t>Explain why synthetic data helps learning without privacy issues.</a:t>
+              <a:rPr lang="en-AU" dirty="0"/>
+              <a:t>Technical Structure of the application, from getting user prompt to generating the output. Explain in details on how AI Agent would interact with User Prompt, Medical Context, the use of Vector and embeddings with the web tools.</a:t>
             </a:r>
+            <a:endParaRPr dirty="0"/>
           </a:p>
         </p:txBody>
       </p:sp>
@@ -6420,7 +9193,7 @@
 </p:notes>
 </file>
 
-<file path=ppt/notesSlides/notesSlide4.xml><?xml version="1.0" encoding="utf-8"?>
+<file path=ppt/notesSlides/notesSlide5.xml><?xml version="1.0" encoding="utf-8"?>
 <p:notes xmlns:a="http://schemas.openxmlformats.org/drawingml/2006/main" xmlns:r="http://schemas.openxmlformats.org/officeDocument/2006/relationships" xmlns:p="http://schemas.openxmlformats.org/presentationml/2006/main">
   <p:cSld>
     <p:spTree>
@@ -6490,7 +9263,7 @@
 </p:notes>
 </file>
 
-<file path=ppt/notesSlides/notesSlide5.xml><?xml version="1.0" encoding="utf-8"?>
+<file path=ppt/notesSlides/notesSlide6.xml><?xml version="1.0" encoding="utf-8"?>
 <p:notes xmlns:a="http://schemas.openxmlformats.org/drawingml/2006/main" xmlns:r="http://schemas.openxmlformats.org/officeDocument/2006/relationships" xmlns:p="http://schemas.openxmlformats.org/presentationml/2006/main">
   <p:cSld>
     <p:spTree>
@@ -6739,7 +9512,7 @@
           <a:p>
             <a:fld id="{5BCAD085-E8A6-8845-BD4E-CB4CCA059FC4}" type="datetimeFigureOut">
               <a:rPr lang="en-US" smtClean="0"/>
-              <a:t>12/1/2025</a:t>
+              <a:t>12/2/2025</a:t>
             </a:fld>
             <a:endParaRPr lang="en-US"/>
           </a:p>
@@ -6907,7 +9680,7 @@
           <a:p>
             <a:fld id="{5BCAD085-E8A6-8845-BD4E-CB4CCA059FC4}" type="datetimeFigureOut">
               <a:rPr lang="en-US" smtClean="0"/>
-              <a:t>12/1/2025</a:t>
+              <a:t>12/2/2025</a:t>
             </a:fld>
             <a:endParaRPr lang="en-US"/>
           </a:p>
@@ -7085,7 +9858,7 @@
           <a:p>
             <a:fld id="{5BCAD085-E8A6-8845-BD4E-CB4CCA059FC4}" type="datetimeFigureOut">
               <a:rPr lang="en-US" smtClean="0"/>
-              <a:t>12/1/2025</a:t>
+              <a:t>12/2/2025</a:t>
             </a:fld>
             <a:endParaRPr lang="en-US"/>
           </a:p>
@@ -7253,7 +10026,7 @@
           <a:p>
             <a:fld id="{5BCAD085-E8A6-8845-BD4E-CB4CCA059FC4}" type="datetimeFigureOut">
               <a:rPr lang="en-US" smtClean="0"/>
-              <a:t>12/1/2025</a:t>
+              <a:t>12/2/2025</a:t>
             </a:fld>
             <a:endParaRPr lang="en-US"/>
           </a:p>
@@ -7498,7 +10271,7 @@
           <a:p>
             <a:fld id="{5BCAD085-E8A6-8845-BD4E-CB4CCA059FC4}" type="datetimeFigureOut">
               <a:rPr lang="en-US" smtClean="0"/>
-              <a:t>12/1/2025</a:t>
+              <a:t>12/2/2025</a:t>
             </a:fld>
             <a:endParaRPr lang="en-US"/>
           </a:p>
@@ -7783,7 +10556,7 @@
           <a:p>
             <a:fld id="{5BCAD085-E8A6-8845-BD4E-CB4CCA059FC4}" type="datetimeFigureOut">
               <a:rPr lang="en-US" smtClean="0"/>
-              <a:t>12/1/2025</a:t>
+              <a:t>12/2/2025</a:t>
             </a:fld>
             <a:endParaRPr lang="en-US"/>
           </a:p>
@@ -8202,7 +10975,7 @@
           <a:p>
             <a:fld id="{5BCAD085-E8A6-8845-BD4E-CB4CCA059FC4}" type="datetimeFigureOut">
               <a:rPr lang="en-US" smtClean="0"/>
-              <a:t>12/1/2025</a:t>
+              <a:t>12/2/2025</a:t>
             </a:fld>
             <a:endParaRPr lang="en-US"/>
           </a:p>
@@ -8319,7 +11092,7 @@
           <a:p>
             <a:fld id="{5BCAD085-E8A6-8845-BD4E-CB4CCA059FC4}" type="datetimeFigureOut">
               <a:rPr lang="en-US" smtClean="0"/>
-              <a:t>12/1/2025</a:t>
+              <a:t>12/2/2025</a:t>
             </a:fld>
             <a:endParaRPr lang="en-US"/>
           </a:p>
@@ -8414,7 +11187,7 @@
           <a:p>
             <a:fld id="{5BCAD085-E8A6-8845-BD4E-CB4CCA059FC4}" type="datetimeFigureOut">
               <a:rPr lang="en-US" smtClean="0"/>
-              <a:t>12/1/2025</a:t>
+              <a:t>12/2/2025</a:t>
             </a:fld>
             <a:endParaRPr lang="en-US"/>
           </a:p>
@@ -8689,7 +11462,7 @@
           <a:p>
             <a:fld id="{5BCAD085-E8A6-8845-BD4E-CB4CCA059FC4}" type="datetimeFigureOut">
               <a:rPr lang="en-US" smtClean="0"/>
-              <a:t>12/1/2025</a:t>
+              <a:t>12/2/2025</a:t>
             </a:fld>
             <a:endParaRPr lang="en-US"/>
           </a:p>
@@ -8941,7 +11714,7 @@
           <a:p>
             <a:fld id="{5BCAD085-E8A6-8845-BD4E-CB4CCA059FC4}" type="datetimeFigureOut">
               <a:rPr lang="en-US" smtClean="0"/>
-              <a:t>12/1/2025</a:t>
+              <a:t>12/2/2025</a:t>
             </a:fld>
             <a:endParaRPr lang="en-US"/>
           </a:p>
@@ -9152,7 +11925,7 @@
           <a:p>
             <a:fld id="{5BCAD085-E8A6-8845-BD4E-CB4CCA059FC4}" type="datetimeFigureOut">
               <a:rPr lang="en-US" smtClean="0"/>
-              <a:t>12/1/2025</a:t>
+              <a:t>12/2/2025</a:t>
             </a:fld>
             <a:endParaRPr lang="en-US"/>
           </a:p>
@@ -10079,7 +12852,7 @@
           <a:p>
             <a:pPr algn="l"/>
             <a:r>
-              <a:rPr lang="en-AU" sz="4200">
+              <a:rPr lang="en-AU" sz="4200" dirty="0">
                 <a:solidFill>
                   <a:srgbClr val="FFFFFF"/>
                 </a:solidFill>
@@ -10102,7 +12875,7 @@
         </p:nvSpPr>
         <p:spPr>
           <a:xfrm>
-            <a:off x="1013011" y="4870824"/>
+            <a:off x="986118" y="4734325"/>
             <a:ext cx="7504463" cy="1458258"/>
           </a:xfrm>
         </p:spPr>
@@ -10118,7 +12891,7 @@
               </a:lnSpc>
             </a:pPr>
             <a:r>
-              <a:rPr lang="en-AU" sz="1500" b="1">
+              <a:rPr lang="en-AU" sz="1500" b="1" dirty="0">
                 <a:latin typeface="Calibri"/>
               </a:rPr>
               <a:t>Final Project Presentation</a:t>
@@ -10131,7 +12904,7 @@
               </a:lnSpc>
             </a:pPr>
             <a:r>
-              <a:rPr lang="en-AU" sz="1500">
+              <a:rPr lang="en-AU" sz="1500" dirty="0">
                 <a:latin typeface="Calibri"/>
               </a:rPr>
               <a:t>Daimond Hidris</a:t>
@@ -10144,7 +12917,7 @@
               </a:lnSpc>
             </a:pPr>
             <a:r>
-              <a:rPr lang="en-AU" sz="1500">
+              <a:rPr lang="en-AU" sz="1500" dirty="0">
                 <a:latin typeface="Calibri"/>
               </a:rPr>
               <a:t>Denise Lai</a:t>
@@ -10157,7 +12930,7 @@
               </a:lnSpc>
             </a:pPr>
             <a:r>
-              <a:rPr lang="en-AU" sz="1500">
+              <a:rPr lang="en-AU" sz="1500" dirty="0">
                 <a:latin typeface="Calibri"/>
               </a:rPr>
               <a:t>John Hart</a:t>
@@ -10170,7 +12943,7 @@
               </a:lnSpc>
             </a:pPr>
             <a:r>
-              <a:rPr lang="en-AU" sz="1500">
+              <a:rPr lang="en-AU" sz="1500" dirty="0">
                 <a:latin typeface="Calibri"/>
               </a:rPr>
               <a:t>Jolyon Smith</a:t>
@@ -10178,15 +12951,659 @@
           </a:p>
         </p:txBody>
       </p:sp>
+      <p:pic>
+        <p:nvPicPr>
+          <p:cNvPr id="4" name="slide_1_narration_v2">
+            <a:hlinkClick r:id="" action="ppaction://media"/>
+            <a:extLst>
+              <a:ext uri="{FF2B5EF4-FFF2-40B4-BE49-F238E27FC236}">
+                <a16:creationId xmlns:a16="http://schemas.microsoft.com/office/drawing/2014/main" id="{359404CB-9F44-C85F-3371-53E433498D4C}"/>
+              </a:ext>
+            </a:extLst>
+          </p:cNvPr>
+          <p:cNvPicPr>
+            <a:picLocks noChangeAspect="1"/>
+          </p:cNvPicPr>
+          <p:nvPr>
+            <a:audioFile r:link="rId2"/>
+            <p:extLst>
+              <p:ext uri="{DAA4B4D4-6D71-4841-9C94-3DE7FCFB9230}">
+                <p14:media xmlns:p14="http://schemas.microsoft.com/office/powerpoint/2010/main" r:embed="rId1"/>
+              </p:ext>
+            </p:extLst>
+          </p:nvPr>
+        </p:nvPicPr>
+        <p:blipFill>
+          <a:blip r:embed="rId5"/>
+          <a:stretch>
+            <a:fillRect/>
+          </a:stretch>
+        </p:blipFill>
+        <p:spPr>
+          <a:xfrm>
+            <a:off x="8549188" y="283708"/>
+            <a:ext cx="304800" cy="304800"/>
+          </a:xfrm>
+          <a:prstGeom prst="rect">
+            <a:avLst/>
+          </a:prstGeom>
+        </p:spPr>
+      </p:pic>
     </p:spTree>
   </p:cSld>
   <p:clrMapOvr>
     <a:masterClrMapping/>
   </p:clrMapOvr>
+  <p:timing>
+    <p:tnLst>
+      <p:par>
+        <p:cTn id="1" dur="indefinite" restart="never" nodeType="tmRoot">
+          <p:childTnLst>
+            <p:seq concurrent="1" nextAc="seek">
+              <p:cTn id="2" dur="indefinite" nodeType="mainSeq">
+                <p:childTnLst>
+                  <p:par>
+                    <p:cTn id="3" fill="hold">
+                      <p:stCondLst>
+                        <p:cond delay="indefinite"/>
+                      </p:stCondLst>
+                      <p:childTnLst>
+                        <p:par>
+                          <p:cTn id="4" fill="hold">
+                            <p:stCondLst>
+                              <p:cond delay="0"/>
+                            </p:stCondLst>
+                            <p:childTnLst>
+                              <p:par>
+                                <p:cTn id="5" presetID="1" presetClass="mediacall" presetSubtype="0" fill="hold" nodeType="clickEffect">
+                                  <p:stCondLst>
+                                    <p:cond delay="0"/>
+                                  </p:stCondLst>
+                                  <p:childTnLst>
+                                    <p:cmd type="call" cmd="playFrom(0.0)">
+                                      <p:cBhvr>
+                                        <p:cTn id="6" dur="38064" fill="hold"/>
+                                        <p:tgtEl>
+                                          <p:spTgt spid="4"/>
+                                        </p:tgtEl>
+                                      </p:cBhvr>
+                                    </p:cmd>
+                                  </p:childTnLst>
+                                </p:cTn>
+                              </p:par>
+                            </p:childTnLst>
+                          </p:cTn>
+                        </p:par>
+                      </p:childTnLst>
+                    </p:cTn>
+                  </p:par>
+                </p:childTnLst>
+              </p:cTn>
+              <p:prevCondLst>
+                <p:cond evt="onPrev" delay="0">
+                  <p:tgtEl>
+                    <p:sldTgt/>
+                  </p:tgtEl>
+                </p:cond>
+              </p:prevCondLst>
+              <p:nextCondLst>
+                <p:cond evt="onNext" delay="0">
+                  <p:tgtEl>
+                    <p:sldTgt/>
+                  </p:tgtEl>
+                </p:cond>
+              </p:nextCondLst>
+            </p:seq>
+            <p:audio>
+              <p:cMediaNode vol="80000">
+                <p:cTn id="7" fill="hold" display="0">
+                  <p:stCondLst>
+                    <p:cond delay="indefinite"/>
+                  </p:stCondLst>
+                  <p:endCondLst>
+                    <p:cond evt="onStopAudio" delay="0">
+                      <p:tgtEl>
+                        <p:sldTgt/>
+                      </p:tgtEl>
+                    </p:cond>
+                  </p:endCondLst>
+                </p:cTn>
+                <p:tgtEl>
+                  <p:spTgt spid="4"/>
+                </p:tgtEl>
+              </p:cMediaNode>
+            </p:audio>
+          </p:childTnLst>
+        </p:cTn>
+      </p:par>
+    </p:tnLst>
+  </p:timing>
 </p:sld>
 </file>
 
 <file path=ppt/slides/slide2.xml><?xml version="1.0" encoding="utf-8"?>
+<p:sld xmlns:a="http://schemas.openxmlformats.org/drawingml/2006/main" xmlns:r="http://schemas.openxmlformats.org/officeDocument/2006/relationships" xmlns:p="http://schemas.openxmlformats.org/presentationml/2006/main">
+  <p:cSld>
+    <p:bg>
+      <p:bgPr>
+        <a:solidFill>
+          <a:schemeClr val="bg1"/>
+        </a:solidFill>
+        <a:effectLst/>
+      </p:bgPr>
+    </p:bg>
+    <p:spTree>
+      <p:nvGrpSpPr>
+        <p:cNvPr id="1" name=""/>
+        <p:cNvGrpSpPr/>
+        <p:nvPr/>
+      </p:nvGrpSpPr>
+      <p:grpSpPr>
+        <a:xfrm>
+          <a:off x="0" y="0"/>
+          <a:ext cx="0" cy="0"/>
+          <a:chOff x="0" y="0"/>
+          <a:chExt cx="0" cy="0"/>
+        </a:xfrm>
+      </p:grpSpPr>
+      <p:sp useBgFill="1">
+        <p:nvSpPr>
+          <p:cNvPr id="17" name="Rectangle 16">
+            <a:extLst>
+              <a:ext uri="{FF2B5EF4-FFF2-40B4-BE49-F238E27FC236}">
+                <a16:creationId xmlns:a16="http://schemas.microsoft.com/office/drawing/2014/main" id="{BACC6370-2D7E-4714-9D71-7542949D7D5D}"/>
+              </a:ext>
+              <a:ext uri="{C183D7F6-B498-43B3-948B-1728B52AA6E4}">
+                <adec:decorative xmlns:adec="http://schemas.microsoft.com/office/drawing/2017/decorative" val="1"/>
+              </a:ext>
+            </a:extLst>
+          </p:cNvPr>
+          <p:cNvSpPr>
+            <a:spLocks noGrp="1" noRot="1" noChangeAspect="1" noMove="1" noResize="1" noEditPoints="1" noAdjustHandles="1" noChangeArrowheads="1" noChangeShapeType="1" noTextEdit="1"/>
+          </p:cNvSpPr>
+          <p:nvPr>
+            <p:extLst>
+              <p:ext uri="{386F3935-93C4-4BCD-93E2-E3B085C9AB24}">
+                <p16:designElem xmlns:p16="http://schemas.microsoft.com/office/powerpoint/2015/main" val="1"/>
+              </p:ext>
+            </p:extLst>
+          </p:nvPr>
+        </p:nvSpPr>
+        <p:spPr>
+          <a:xfrm>
+            <a:off x="0" y="0"/>
+            <a:ext cx="9144000" cy="6858000"/>
+          </a:xfrm>
+          <a:prstGeom prst="rect">
+            <a:avLst/>
+          </a:prstGeom>
+          <a:ln w="12700" cap="flat" cmpd="sng" algn="ctr">
+            <a:noFill/>
+            <a:prstDash val="solid"/>
+            <a:miter lim="800000"/>
+          </a:ln>
+          <a:effectLst/>
+          <a:extLst>
+            <a:ext uri="{91240B29-F687-4F45-9708-019B960494DF}">
+              <a14:hiddenLine xmlns:a14="http://schemas.microsoft.com/office/drawing/2010/main" w="12700" cap="flat" cmpd="sng" algn="ctr">
+                <a:solidFill>
+                  <a:schemeClr val="accent1">
+                    <a:shade val="50000"/>
+                  </a:schemeClr>
+                </a:solidFill>
+                <a:prstDash val="solid"/>
+                <a:miter lim="800000"/>
+              </a14:hiddenLine>
+            </a:ext>
+          </a:extLst>
+        </p:spPr>
+        <p:style>
+          <a:lnRef idx="2">
+            <a:schemeClr val="accent1">
+              <a:shade val="50000"/>
+            </a:schemeClr>
+          </a:lnRef>
+          <a:fillRef idx="1">
+            <a:schemeClr val="accent1"/>
+          </a:fillRef>
+          <a:effectRef idx="0">
+            <a:schemeClr val="accent1"/>
+          </a:effectRef>
+          <a:fontRef idx="minor">
+            <a:schemeClr val="lt1"/>
+          </a:fontRef>
+        </p:style>
+        <p:txBody>
+          <a:bodyPr rtlCol="0" anchor="ctr"/>
+          <a:lstStyle/>
+          <a:p>
+            <a:pPr algn="ctr"/>
+            <a:endParaRPr lang="en-US"/>
+          </a:p>
+        </p:txBody>
+      </p:sp>
+      <p:sp>
+        <p:nvSpPr>
+          <p:cNvPr id="18" name="Rectangle 17">
+            <a:extLst>
+              <a:ext uri="{FF2B5EF4-FFF2-40B4-BE49-F238E27FC236}">
+                <a16:creationId xmlns:a16="http://schemas.microsoft.com/office/drawing/2014/main" id="{F68B3F68-107C-434F-AA38-110D5EA91B85}"/>
+              </a:ext>
+              <a:ext uri="{C183D7F6-B498-43B3-948B-1728B52AA6E4}">
+                <adec:decorative xmlns:adec="http://schemas.microsoft.com/office/drawing/2017/decorative" val="1"/>
+              </a:ext>
+            </a:extLst>
+          </p:cNvPr>
+          <p:cNvSpPr>
+            <a:spLocks noGrp="1" noRot="1" noChangeAspect="1" noMove="1" noResize="1" noEditPoints="1" noAdjustHandles="1" noChangeArrowheads="1" noChangeShapeType="1" noTextEdit="1"/>
+          </p:cNvSpPr>
+          <p:nvPr>
+            <p:extLst>
+              <p:ext uri="{386F3935-93C4-4BCD-93E2-E3B085C9AB24}">
+                <p16:designElem xmlns:p16="http://schemas.microsoft.com/office/powerpoint/2015/main" val="1"/>
+              </p:ext>
+            </p:extLst>
+          </p:nvPr>
+        </p:nvSpPr>
+        <p:spPr>
+          <a:xfrm flipH="1">
+            <a:off x="1" y="0"/>
+            <a:ext cx="9143999" cy="1575955"/>
+          </a:xfrm>
+          <a:prstGeom prst="rect">
+            <a:avLst/>
+          </a:prstGeom>
+          <a:gradFill>
+            <a:gsLst>
+              <a:gs pos="0">
+                <a:srgbClr val="000000">
+                  <a:alpha val="96000"/>
+                </a:srgbClr>
+              </a:gs>
+              <a:gs pos="100000">
+                <a:schemeClr val="accent1">
+                  <a:lumMod val="75000"/>
+                </a:schemeClr>
+              </a:gs>
+            </a:gsLst>
+            <a:lin ang="8400000" scaled="0"/>
+          </a:gradFill>
+          <a:ln>
+            <a:noFill/>
+          </a:ln>
+        </p:spPr>
+        <p:style>
+          <a:lnRef idx="2">
+            <a:schemeClr val="accent1">
+              <a:shade val="50000"/>
+            </a:schemeClr>
+          </a:lnRef>
+          <a:fillRef idx="1">
+            <a:schemeClr val="accent1"/>
+          </a:fillRef>
+          <a:effectRef idx="0">
+            <a:schemeClr val="accent1"/>
+          </a:effectRef>
+          <a:fontRef idx="minor">
+            <a:schemeClr val="lt1"/>
+          </a:fontRef>
+        </p:style>
+        <p:txBody>
+          <a:bodyPr rtlCol="0" anchor="ctr"/>
+          <a:lstStyle/>
+          <a:p>
+            <a:pPr algn="ctr"/>
+            <a:endParaRPr lang="en-US"/>
+          </a:p>
+        </p:txBody>
+      </p:sp>
+      <p:sp>
+        <p:nvSpPr>
+          <p:cNvPr id="19" name="Rectangle 18">
+            <a:extLst>
+              <a:ext uri="{FF2B5EF4-FFF2-40B4-BE49-F238E27FC236}">
+                <a16:creationId xmlns:a16="http://schemas.microsoft.com/office/drawing/2014/main" id="{AAD0DBB9-1A4B-4391-81D4-CB19F9AB918A}"/>
+              </a:ext>
+              <a:ext uri="{C183D7F6-B498-43B3-948B-1728B52AA6E4}">
+                <adec:decorative xmlns:adec="http://schemas.microsoft.com/office/drawing/2017/decorative" val="1"/>
+              </a:ext>
+            </a:extLst>
+          </p:cNvPr>
+          <p:cNvSpPr>
+            <a:spLocks noGrp="1" noRot="1" noChangeAspect="1" noMove="1" noResize="1" noEditPoints="1" noAdjustHandles="1" noChangeArrowheads="1" noChangeShapeType="1" noTextEdit="1"/>
+          </p:cNvSpPr>
+          <p:nvPr>
+            <p:extLst>
+              <p:ext uri="{386F3935-93C4-4BCD-93E2-E3B085C9AB24}">
+                <p16:designElem xmlns:p16="http://schemas.microsoft.com/office/powerpoint/2015/main" val="1"/>
+              </p:ext>
+            </p:extLst>
+          </p:nvPr>
+        </p:nvSpPr>
+        <p:spPr>
+          <a:xfrm rot="10800000" flipH="1">
+            <a:off x="6096642" y="0"/>
+            <a:ext cx="3047358" cy="1576412"/>
+          </a:xfrm>
+          <a:prstGeom prst="rect">
+            <a:avLst/>
+          </a:prstGeom>
+          <a:gradFill>
+            <a:gsLst>
+              <a:gs pos="19000">
+                <a:schemeClr val="accent1">
+                  <a:lumMod val="50000"/>
+                  <a:alpha val="68000"/>
+                </a:schemeClr>
+              </a:gs>
+              <a:gs pos="100000">
+                <a:schemeClr val="accent1">
+                  <a:alpha val="79000"/>
+                </a:schemeClr>
+              </a:gs>
+            </a:gsLst>
+            <a:lin ang="19200000" scaled="0"/>
+          </a:gradFill>
+          <a:ln>
+            <a:noFill/>
+          </a:ln>
+        </p:spPr>
+        <p:style>
+          <a:lnRef idx="2">
+            <a:schemeClr val="accent1">
+              <a:shade val="50000"/>
+            </a:schemeClr>
+          </a:lnRef>
+          <a:fillRef idx="1">
+            <a:schemeClr val="accent1"/>
+          </a:fillRef>
+          <a:effectRef idx="0">
+            <a:schemeClr val="accent1"/>
+          </a:effectRef>
+          <a:fontRef idx="minor">
+            <a:schemeClr val="lt1"/>
+          </a:fontRef>
+        </p:style>
+        <p:txBody>
+          <a:bodyPr rtlCol="0" anchor="ctr"/>
+          <a:lstStyle/>
+          <a:p>
+            <a:pPr algn="ctr"/>
+            <a:endParaRPr lang="en-US"/>
+          </a:p>
+        </p:txBody>
+      </p:sp>
+      <p:sp>
+        <p:nvSpPr>
+          <p:cNvPr id="20" name="Rectangle 19">
+            <a:extLst>
+              <a:ext uri="{FF2B5EF4-FFF2-40B4-BE49-F238E27FC236}">
+                <a16:creationId xmlns:a16="http://schemas.microsoft.com/office/drawing/2014/main" id="{063BBA22-50EA-4C4D-BE05-F1CE4E63AA56}"/>
+              </a:ext>
+              <a:ext uri="{C183D7F6-B498-43B3-948B-1728B52AA6E4}">
+                <adec:decorative xmlns:adec="http://schemas.microsoft.com/office/drawing/2017/decorative" val="1"/>
+              </a:ext>
+            </a:extLst>
+          </p:cNvPr>
+          <p:cNvSpPr>
+            <a:spLocks noGrp="1" noRot="1" noChangeAspect="1" noMove="1" noResize="1" noEditPoints="1" noAdjustHandles="1" noChangeArrowheads="1" noChangeShapeType="1" noTextEdit="1"/>
+          </p:cNvSpPr>
+          <p:nvPr>
+            <p:extLst>
+              <p:ext uri="{386F3935-93C4-4BCD-93E2-E3B085C9AB24}">
+                <p16:designElem xmlns:p16="http://schemas.microsoft.com/office/powerpoint/2015/main" val="1"/>
+              </p:ext>
+            </p:extLst>
+          </p:nvPr>
+        </p:nvSpPr>
+        <p:spPr>
+          <a:xfrm rot="5400000">
+            <a:off x="3783777" y="-3783778"/>
+            <a:ext cx="1576446" cy="9144002"/>
+          </a:xfrm>
+          <a:prstGeom prst="rect">
+            <a:avLst/>
+          </a:prstGeom>
+          <a:gradFill>
+            <a:gsLst>
+              <a:gs pos="23000">
+                <a:schemeClr val="accent1">
+                  <a:alpha val="0"/>
+                </a:schemeClr>
+              </a:gs>
+              <a:gs pos="99000">
+                <a:srgbClr val="000000">
+                  <a:alpha val="74000"/>
+                </a:srgbClr>
+              </a:gs>
+            </a:gsLst>
+            <a:lin ang="20400000" scaled="0"/>
+          </a:gradFill>
+          <a:ln>
+            <a:noFill/>
+          </a:ln>
+        </p:spPr>
+        <p:style>
+          <a:lnRef idx="2">
+            <a:schemeClr val="accent1">
+              <a:shade val="50000"/>
+            </a:schemeClr>
+          </a:lnRef>
+          <a:fillRef idx="1">
+            <a:schemeClr val="accent1"/>
+          </a:fillRef>
+          <a:effectRef idx="0">
+            <a:schemeClr val="accent1"/>
+          </a:effectRef>
+          <a:fontRef idx="minor">
+            <a:schemeClr val="lt1"/>
+          </a:fontRef>
+        </p:style>
+        <p:txBody>
+          <a:bodyPr rtlCol="0" anchor="ctr"/>
+          <a:lstStyle/>
+          <a:p>
+            <a:pPr algn="ctr"/>
+            <a:endParaRPr lang="en-US" dirty="0"/>
+          </a:p>
+        </p:txBody>
+      </p:sp>
+      <p:sp>
+        <p:nvSpPr>
+          <p:cNvPr id="2" name="Title 1"/>
+          <p:cNvSpPr>
+            <a:spLocks noGrp="1"/>
+          </p:cNvSpPr>
+          <p:nvPr>
+            <p:ph type="title"/>
+          </p:nvPr>
+        </p:nvSpPr>
+        <p:spPr>
+          <a:xfrm>
+            <a:off x="1028697" y="348865"/>
+            <a:ext cx="7533018" cy="877729"/>
+          </a:xfrm>
+        </p:spPr>
+        <p:txBody>
+          <a:bodyPr anchor="ctr">
+            <a:normAutofit/>
+          </a:bodyPr>
+          <a:lstStyle/>
+          <a:p>
+            <a:r>
+              <a:rPr lang="en-AU" sz="3500" dirty="0">
+                <a:solidFill>
+                  <a:srgbClr val="FFFFFF"/>
+                </a:solidFill>
+                <a:latin typeface="Calibri"/>
+              </a:rPr>
+              <a:t>The Why</a:t>
+            </a:r>
+          </a:p>
+        </p:txBody>
+      </p:sp>
+      <p:graphicFrame>
+        <p:nvGraphicFramePr>
+          <p:cNvPr id="21" name="Content Placeholder 2">
+            <a:extLst>
+              <a:ext uri="{FF2B5EF4-FFF2-40B4-BE49-F238E27FC236}">
+                <a16:creationId xmlns:a16="http://schemas.microsoft.com/office/drawing/2014/main" id="{DA546AFA-2DE6-A968-4392-85693662AEE4}"/>
+              </a:ext>
+            </a:extLst>
+          </p:cNvPr>
+          <p:cNvGraphicFramePr>
+            <a:graphicFrameLocks noGrp="1"/>
+          </p:cNvGraphicFramePr>
+          <p:nvPr>
+            <p:ph idx="1"/>
+            <p:extLst>
+              <p:ext uri="{D42A27DB-BD31-4B8C-83A1-F6EECF244321}">
+                <p14:modId xmlns:p14="http://schemas.microsoft.com/office/powerpoint/2010/main" val="2203457347"/>
+              </p:ext>
+            </p:extLst>
+          </p:nvPr>
+        </p:nvGraphicFramePr>
+        <p:xfrm>
+          <a:off x="483042" y="2112579"/>
+          <a:ext cx="8195871" cy="4192805"/>
+        </p:xfrm>
+        <a:graphic>
+          <a:graphicData uri="http://schemas.openxmlformats.org/drawingml/2006/diagram">
+            <dgm:relIds xmlns:dgm="http://schemas.openxmlformats.org/drawingml/2006/diagram" xmlns:r="http://schemas.openxmlformats.org/officeDocument/2006/relationships" r:dm="rId5" r:lo="rId6" r:qs="rId7" r:cs="rId8"/>
+          </a:graphicData>
+        </a:graphic>
+      </p:graphicFrame>
+      <p:pic>
+        <p:nvPicPr>
+          <p:cNvPr id="3" name="slide_2_narration_v2">
+            <a:hlinkClick r:id="" action="ppaction://media"/>
+            <a:extLst>
+              <a:ext uri="{FF2B5EF4-FFF2-40B4-BE49-F238E27FC236}">
+                <a16:creationId xmlns:a16="http://schemas.microsoft.com/office/drawing/2014/main" id="{9BC2B451-42CE-AFCA-6A8D-1693DFE1A262}"/>
+              </a:ext>
+            </a:extLst>
+          </p:cNvPr>
+          <p:cNvPicPr>
+            <a:picLocks noChangeAspect="1"/>
+          </p:cNvPicPr>
+          <p:nvPr>
+            <a:audioFile r:link="rId2"/>
+            <p:extLst>
+              <p:ext uri="{DAA4B4D4-6D71-4841-9C94-3DE7FCFB9230}">
+                <p14:media xmlns:p14="http://schemas.microsoft.com/office/powerpoint/2010/main" r:embed="rId1"/>
+              </p:ext>
+            </p:extLst>
+          </p:nvPr>
+        </p:nvPicPr>
+        <p:blipFill>
+          <a:blip r:embed="rId10"/>
+          <a:stretch>
+            <a:fillRect/>
+          </a:stretch>
+        </p:blipFill>
+        <p:spPr>
+          <a:xfrm>
+            <a:off x="8476471" y="334830"/>
+            <a:ext cx="304800" cy="304800"/>
+          </a:xfrm>
+          <a:prstGeom prst="rect">
+            <a:avLst/>
+          </a:prstGeom>
+        </p:spPr>
+      </p:pic>
+    </p:spTree>
+  </p:cSld>
+  <p:clrMapOvr>
+    <a:masterClrMapping/>
+  </p:clrMapOvr>
+  <p:timing>
+    <p:tnLst>
+      <p:par>
+        <p:cTn id="1" dur="indefinite" restart="never" nodeType="tmRoot">
+          <p:childTnLst>
+            <p:seq concurrent="1" nextAc="seek">
+              <p:cTn id="2" dur="indefinite" nodeType="mainSeq">
+                <p:childTnLst>
+                  <p:par>
+                    <p:cTn id="3" fill="hold">
+                      <p:stCondLst>
+                        <p:cond delay="indefinite"/>
+                      </p:stCondLst>
+                      <p:childTnLst>
+                        <p:par>
+                          <p:cTn id="4" fill="hold">
+                            <p:stCondLst>
+                              <p:cond delay="0"/>
+                            </p:stCondLst>
+                            <p:childTnLst>
+                              <p:par>
+                                <p:cTn id="5" presetID="1" presetClass="mediacall" presetSubtype="0" fill="hold" nodeType="clickEffect">
+                                  <p:stCondLst>
+                                    <p:cond delay="0"/>
+                                  </p:stCondLst>
+                                  <p:childTnLst>
+                                    <p:cmd type="call" cmd="playFrom(0.0)">
+                                      <p:cBhvr>
+                                        <p:cTn id="6" dur="28296" fill="hold"/>
+                                        <p:tgtEl>
+                                          <p:spTgt spid="3"/>
+                                        </p:tgtEl>
+                                      </p:cBhvr>
+                                    </p:cmd>
+                                  </p:childTnLst>
+                                </p:cTn>
+                              </p:par>
+                            </p:childTnLst>
+                          </p:cTn>
+                        </p:par>
+                      </p:childTnLst>
+                    </p:cTn>
+                  </p:par>
+                </p:childTnLst>
+              </p:cTn>
+              <p:prevCondLst>
+                <p:cond evt="onPrev" delay="0">
+                  <p:tgtEl>
+                    <p:sldTgt/>
+                  </p:tgtEl>
+                </p:cond>
+              </p:prevCondLst>
+              <p:nextCondLst>
+                <p:cond evt="onNext" delay="0">
+                  <p:tgtEl>
+                    <p:sldTgt/>
+                  </p:tgtEl>
+                </p:cond>
+              </p:nextCondLst>
+            </p:seq>
+            <p:audio>
+              <p:cMediaNode vol="80000">
+                <p:cTn id="7" fill="hold" display="0">
+                  <p:stCondLst>
+                    <p:cond delay="indefinite"/>
+                  </p:stCondLst>
+                  <p:endCondLst>
+                    <p:cond evt="onStopAudio" delay="0">
+                      <p:tgtEl>
+                        <p:sldTgt/>
+                      </p:tgtEl>
+                    </p:cond>
+                  </p:endCondLst>
+                </p:cTn>
+                <p:tgtEl>
+                  <p:spTgt spid="3"/>
+                </p:tgtEl>
+              </p:cMediaNode>
+            </p:audio>
+          </p:childTnLst>
+        </p:cTn>
+      </p:par>
+    </p:tnLst>
+  </p:timing>
+</p:sld>
+</file>
+
+<file path=ppt/slides/slide3.xml><?xml version="1.0" encoding="utf-8"?>
 <p:sld xmlns:a="http://schemas.openxmlformats.org/drawingml/2006/main" xmlns:r="http://schemas.openxmlformats.org/officeDocument/2006/relationships" xmlns:p="http://schemas.openxmlformats.org/presentationml/2006/main">
   <p:cSld>
     <p:bg>
@@ -10561,11 +13978,6 @@
           </p:cNvGraphicFramePr>
           <p:nvPr>
             <p:ph idx="1"/>
-            <p:extLst>
-              <p:ext uri="{D42A27DB-BD31-4B8C-83A1-F6EECF244321}">
-                <p14:modId xmlns:p14="http://schemas.microsoft.com/office/powerpoint/2010/main" val="1692381598"/>
-              </p:ext>
-            </p:extLst>
           </p:nvPr>
         </p:nvGraphicFramePr>
         <p:xfrm>
@@ -10574,19 +13986,146 @@
         </p:xfrm>
         <a:graphic>
           <a:graphicData uri="http://schemas.openxmlformats.org/drawingml/2006/diagram">
-            <dgm:relIds xmlns:dgm="http://schemas.openxmlformats.org/drawingml/2006/diagram" xmlns:r="http://schemas.openxmlformats.org/officeDocument/2006/relationships" r:dm="rId3" r:lo="rId4" r:qs="rId5" r:cs="rId6"/>
+            <dgm:relIds xmlns:dgm="http://schemas.openxmlformats.org/drawingml/2006/diagram" xmlns:r="http://schemas.openxmlformats.org/officeDocument/2006/relationships" r:dm="rId5" r:lo="rId6" r:qs="rId7" r:cs="rId8"/>
           </a:graphicData>
         </a:graphic>
       </p:graphicFrame>
+      <p:pic>
+        <p:nvPicPr>
+          <p:cNvPr id="3" name="slide_3_narration_v2">
+            <a:hlinkClick r:id="" action="ppaction://media"/>
+            <a:extLst>
+              <a:ext uri="{FF2B5EF4-FFF2-40B4-BE49-F238E27FC236}">
+                <a16:creationId xmlns:a16="http://schemas.microsoft.com/office/drawing/2014/main" id="{8CBAB53D-53E6-3B2C-7F13-0CE4CFCC9E89}"/>
+              </a:ext>
+            </a:extLst>
+          </p:cNvPr>
+          <p:cNvPicPr>
+            <a:picLocks noChangeAspect="1"/>
+          </p:cNvPicPr>
+          <p:nvPr>
+            <a:audioFile r:link="rId2"/>
+            <p:extLst>
+              <p:ext uri="{DAA4B4D4-6D71-4841-9C94-3DE7FCFB9230}">
+                <p14:media xmlns:p14="http://schemas.microsoft.com/office/powerpoint/2010/main" r:embed="rId1"/>
+              </p:ext>
+            </p:extLst>
+          </p:nvPr>
+        </p:nvPicPr>
+        <p:blipFill>
+          <a:blip r:embed="rId10"/>
+          <a:stretch>
+            <a:fillRect/>
+          </a:stretch>
+        </p:blipFill>
+        <p:spPr>
+          <a:xfrm>
+            <a:off x="8526513" y="400216"/>
+            <a:ext cx="304800" cy="304800"/>
+          </a:xfrm>
+          <a:prstGeom prst="rect">
+            <a:avLst/>
+          </a:prstGeom>
+        </p:spPr>
+      </p:pic>
     </p:spTree>
+    <p:extLst>
+      <p:ext uri="{BB962C8B-B14F-4D97-AF65-F5344CB8AC3E}">
+        <p14:creationId xmlns:p14="http://schemas.microsoft.com/office/powerpoint/2010/main" val="617408540"/>
+      </p:ext>
+    </p:extLst>
   </p:cSld>
   <p:clrMapOvr>
     <a:masterClrMapping/>
   </p:clrMapOvr>
+  <p:timing>
+    <p:tnLst>
+      <p:par>
+        <p:cTn id="1" dur="indefinite" restart="never" nodeType="tmRoot">
+          <p:childTnLst>
+            <p:seq concurrent="1" nextAc="seek">
+              <p:cTn id="2" dur="indefinite" nodeType="mainSeq">
+                <p:childTnLst>
+                  <p:par>
+                    <p:cTn id="3" fill="hold">
+                      <p:stCondLst>
+                        <p:cond delay="indefinite"/>
+                      </p:stCondLst>
+                      <p:childTnLst>
+                        <p:par>
+                          <p:cTn id="4" fill="hold">
+                            <p:stCondLst>
+                              <p:cond delay="0"/>
+                            </p:stCondLst>
+                            <p:childTnLst>
+                              <p:par>
+                                <p:cTn id="5" presetID="1" presetClass="mediacall" presetSubtype="0" fill="hold" nodeType="clickEffect">
+                                  <p:stCondLst>
+                                    <p:cond delay="0"/>
+                                  </p:stCondLst>
+                                  <p:childTnLst>
+                                    <p:cmd type="call" cmd="playFrom(0.0)">
+                                      <p:cBhvr>
+                                        <p:cTn id="6" dur="23160" fill="hold"/>
+                                        <p:tgtEl>
+                                          <p:spTgt spid="3"/>
+                                        </p:tgtEl>
+                                      </p:cBhvr>
+                                    </p:cmd>
+                                  </p:childTnLst>
+                                </p:cTn>
+                              </p:par>
+                            </p:childTnLst>
+                          </p:cTn>
+                        </p:par>
+                      </p:childTnLst>
+                    </p:cTn>
+                  </p:par>
+                </p:childTnLst>
+              </p:cTn>
+              <p:prevCondLst>
+                <p:cond evt="onPrev" delay="0">
+                  <p:tgtEl>
+                    <p:sldTgt/>
+                  </p:tgtEl>
+                </p:cond>
+              </p:prevCondLst>
+              <p:nextCondLst>
+                <p:cond evt="onNext" delay="0">
+                  <p:tgtEl>
+                    <p:sldTgt/>
+                  </p:tgtEl>
+                </p:cond>
+              </p:nextCondLst>
+            </p:seq>
+            <p:audio>
+              <p:cMediaNode vol="80000">
+                <p:cTn id="7" fill="hold" display="0">
+                  <p:stCondLst>
+                    <p:cond delay="indefinite"/>
+                  </p:stCondLst>
+                  <p:endCondLst>
+                    <p:cond evt="onStopAudio" delay="0">
+                      <p:tgtEl>
+                        <p:sldTgt/>
+                      </p:tgtEl>
+                    </p:cond>
+                  </p:endCondLst>
+                </p:cTn>
+                <p:tgtEl>
+                  <p:spTgt spid="3"/>
+                </p:tgtEl>
+              </p:cMediaNode>
+            </p:audio>
+          </p:childTnLst>
+        </p:cTn>
+      </p:par>
+    </p:tnLst>
+  </p:timing>
 </p:sld>
 </file>
 
-<file path=ppt/slides/slide3.xml><?xml version="1.0" encoding="utf-8"?>
+<file path=ppt/slides/slide4.xml><?xml version="1.0" encoding="utf-8"?>
 <p:sld xmlns:a="http://schemas.openxmlformats.org/drawingml/2006/main" xmlns:r="http://schemas.openxmlformats.org/officeDocument/2006/relationships" xmlns:p="http://schemas.openxmlformats.org/presentationml/2006/main">
   <p:cSld>
     <p:bg>
@@ -10956,31 +14495,6 @@
               </a:rPr>
               <a:t>System Architecture</a:t>
             </a:r>
-          </a:p>
-        </p:txBody>
-      </p:sp>
-      <p:sp>
-        <p:nvSpPr>
-          <p:cNvPr id="4" name="Content Placeholder 3">
-            <a:extLst>
-              <a:ext uri="{FF2B5EF4-FFF2-40B4-BE49-F238E27FC236}">
-                <a16:creationId xmlns:a16="http://schemas.microsoft.com/office/drawing/2014/main" id="{BFDD1B8B-1BED-AC83-6F0E-ABAE4DECABEE}"/>
-              </a:ext>
-            </a:extLst>
-          </p:cNvPr>
-          <p:cNvSpPr>
-            <a:spLocks noGrp="1"/>
-          </p:cNvSpPr>
-          <p:nvPr>
-            <p:ph idx="1"/>
-          </p:nvPr>
-        </p:nvSpPr>
-        <p:spPr/>
-        <p:txBody>
-          <a:bodyPr/>
-          <a:lstStyle/>
-          <a:p>
-            <a:endParaRPr lang="en-AU" dirty="0"/>
           </a:p>
         </p:txBody>
       </p:sp>
@@ -11508,6 +15022,42 @@
           </a:p>
         </p:txBody>
       </p:sp>
+      <p:pic>
+        <p:nvPicPr>
+          <p:cNvPr id="21" name="slide_4_narration_v2">
+            <a:hlinkClick r:id="" action="ppaction://media"/>
+            <a:extLst>
+              <a:ext uri="{FF2B5EF4-FFF2-40B4-BE49-F238E27FC236}">
+                <a16:creationId xmlns:a16="http://schemas.microsoft.com/office/drawing/2014/main" id="{4F33D025-E431-3DBA-0FF6-4774E91E8157}"/>
+              </a:ext>
+            </a:extLst>
+          </p:cNvPr>
+          <p:cNvPicPr>
+            <a:picLocks noGrp="1" noChangeAspect="1"/>
+          </p:cNvPicPr>
+          <p:nvPr>
+            <p:ph idx="1"/>
+            <a:audioFile r:link="rId2"/>
+            <p:extLst>
+              <p:ext uri="{DAA4B4D4-6D71-4841-9C94-3DE7FCFB9230}">
+                <p14:media xmlns:p14="http://schemas.microsoft.com/office/powerpoint/2010/main" r:embed="rId1"/>
+              </p:ext>
+            </p:extLst>
+          </p:nvPr>
+        </p:nvPicPr>
+        <p:blipFill>
+          <a:blip r:embed="rId5"/>
+          <a:stretch>
+            <a:fillRect/>
+          </a:stretch>
+        </p:blipFill>
+        <p:spPr>
+          <a:xfrm>
+            <a:off x="8516683" y="263998"/>
+            <a:ext cx="304800" cy="304800"/>
+          </a:xfrm>
+        </p:spPr>
+      </p:pic>
     </p:spTree>
     <p:extLst>
       <p:ext uri="{BB962C8B-B14F-4D97-AF65-F5344CB8AC3E}">
@@ -11518,10 +15068,94 @@
   <p:clrMapOvr>
     <a:masterClrMapping/>
   </p:clrMapOvr>
+  <p:timing>
+    <p:tnLst>
+      <p:par>
+        <p:cTn id="1" dur="indefinite" restart="never" nodeType="tmRoot">
+          <p:childTnLst>
+            <p:seq concurrent="1" nextAc="seek">
+              <p:cTn id="2" dur="indefinite" nodeType="mainSeq">
+                <p:childTnLst>
+                  <p:par>
+                    <p:cTn id="3" fill="hold">
+                      <p:stCondLst>
+                        <p:cond delay="indefinite"/>
+                      </p:stCondLst>
+                      <p:childTnLst>
+                        <p:par>
+                          <p:cTn id="4" fill="hold">
+                            <p:stCondLst>
+                              <p:cond delay="0"/>
+                            </p:stCondLst>
+                            <p:childTnLst>
+                              <p:par>
+                                <p:cTn id="5" presetID="1" presetClass="mediacall" presetSubtype="0" fill="hold" nodeType="clickEffect">
+                                  <p:stCondLst>
+                                    <p:cond delay="0"/>
+                                  </p:stCondLst>
+                                  <p:childTnLst>
+                                    <p:cmd type="call" cmd="playFrom(0.0)">
+                                      <p:cBhvr>
+                                        <p:cTn id="6" dur="25272" fill="hold"/>
+                                        <p:tgtEl>
+                                          <p:spTgt spid="21"/>
+                                        </p:tgtEl>
+                                      </p:cBhvr>
+                                    </p:cmd>
+                                  </p:childTnLst>
+                                </p:cTn>
+                              </p:par>
+                            </p:childTnLst>
+                          </p:cTn>
+                        </p:par>
+                      </p:childTnLst>
+                    </p:cTn>
+                  </p:par>
+                </p:childTnLst>
+              </p:cTn>
+              <p:prevCondLst>
+                <p:cond evt="onPrev" delay="0">
+                  <p:tgtEl>
+                    <p:sldTgt/>
+                  </p:tgtEl>
+                </p:cond>
+              </p:prevCondLst>
+              <p:nextCondLst>
+                <p:cond evt="onNext" delay="0">
+                  <p:tgtEl>
+                    <p:sldTgt/>
+                  </p:tgtEl>
+                </p:cond>
+              </p:nextCondLst>
+            </p:seq>
+            <p:audio>
+              <p:cMediaNode vol="80000">
+                <p:cTn id="7" fill="hold" display="0">
+                  <p:stCondLst>
+                    <p:cond delay="indefinite"/>
+                  </p:stCondLst>
+                  <p:endCondLst>
+                    <p:cond evt="onStopAudio" delay="0">
+                      <p:tgtEl>
+                        <p:sldTgt/>
+                      </p:tgtEl>
+                    </p:cond>
+                  </p:endCondLst>
+                </p:cTn>
+                <p:tgtEl>
+                  <p:spTgt spid="21"/>
+                </p:tgtEl>
+              </p:cMediaNode>
+            </p:audio>
+          </p:childTnLst>
+        </p:cTn>
+      </p:par>
+    </p:tnLst>
+  </p:timing>
 </p:sld>
 </file>
 
-<file path=ppt/slides/slide4.xml><?xml version="1.0" encoding="utf-8"?>
+<file path=ppt/slides/slide5.xml><?xml version="1.0" encoding="utf-8"?>
 <p:sld xmlns:a="http://schemas.openxmlformats.org/drawingml/2006/main" xmlns:r="http://schemas.openxmlformats.org/officeDocument/2006/relationships" xmlns:p="http://schemas.openxmlformats.org/presentationml/2006/main">
   <p:cSld>
     <p:bg>
@@ -11909,19 +15543,141 @@
         </p:xfrm>
         <a:graphic>
           <a:graphicData uri="http://schemas.openxmlformats.org/drawingml/2006/diagram">
-            <dgm:relIds xmlns:dgm="http://schemas.openxmlformats.org/drawingml/2006/diagram" xmlns:r="http://schemas.openxmlformats.org/officeDocument/2006/relationships" r:dm="rId3" r:lo="rId4" r:qs="rId5" r:cs="rId6"/>
+            <dgm:relIds xmlns:dgm="http://schemas.openxmlformats.org/drawingml/2006/diagram" xmlns:r="http://schemas.openxmlformats.org/officeDocument/2006/relationships" r:dm="rId5" r:lo="rId6" r:qs="rId7" r:cs="rId8"/>
           </a:graphicData>
         </a:graphic>
       </p:graphicFrame>
+      <p:pic>
+        <p:nvPicPr>
+          <p:cNvPr id="3" name="slide_5_narration_v2">
+            <a:hlinkClick r:id="" action="ppaction://media"/>
+            <a:extLst>
+              <a:ext uri="{FF2B5EF4-FFF2-40B4-BE49-F238E27FC236}">
+                <a16:creationId xmlns:a16="http://schemas.microsoft.com/office/drawing/2014/main" id="{5EEAC384-AC45-DB12-06BD-4726C4E42111}"/>
+              </a:ext>
+            </a:extLst>
+          </p:cNvPr>
+          <p:cNvPicPr>
+            <a:picLocks noChangeAspect="1"/>
+          </p:cNvPicPr>
+          <p:nvPr>
+            <a:audioFile r:link="rId2"/>
+            <p:extLst>
+              <p:ext uri="{DAA4B4D4-6D71-4841-9C94-3DE7FCFB9230}">
+                <p14:media xmlns:p14="http://schemas.microsoft.com/office/powerpoint/2010/main" r:embed="rId1"/>
+              </p:ext>
+            </p:extLst>
+          </p:nvPr>
+        </p:nvPicPr>
+        <p:blipFill>
+          <a:blip r:embed="rId10"/>
+          <a:stretch>
+            <a:fillRect/>
+          </a:stretch>
+        </p:blipFill>
+        <p:spPr>
+          <a:xfrm>
+            <a:off x="8526513" y="247816"/>
+            <a:ext cx="304800" cy="304800"/>
+          </a:xfrm>
+          <a:prstGeom prst="rect">
+            <a:avLst/>
+          </a:prstGeom>
+        </p:spPr>
+      </p:pic>
     </p:spTree>
   </p:cSld>
   <p:clrMapOvr>
     <a:masterClrMapping/>
   </p:clrMapOvr>
+  <p:timing>
+    <p:tnLst>
+      <p:par>
+        <p:cTn id="1" dur="indefinite" restart="never" nodeType="tmRoot">
+          <p:childTnLst>
+            <p:seq concurrent="1" nextAc="seek">
+              <p:cTn id="2" dur="indefinite" nodeType="mainSeq">
+                <p:childTnLst>
+                  <p:par>
+                    <p:cTn id="3" fill="hold">
+                      <p:stCondLst>
+                        <p:cond delay="indefinite"/>
+                      </p:stCondLst>
+                      <p:childTnLst>
+                        <p:par>
+                          <p:cTn id="4" fill="hold">
+                            <p:stCondLst>
+                              <p:cond delay="0"/>
+                            </p:stCondLst>
+                            <p:childTnLst>
+                              <p:par>
+                                <p:cTn id="5" presetID="1" presetClass="mediacall" presetSubtype="0" fill="hold" nodeType="clickEffect">
+                                  <p:stCondLst>
+                                    <p:cond delay="0"/>
+                                  </p:stCondLst>
+                                  <p:childTnLst>
+                                    <p:cmd type="call" cmd="playFrom(0.0)">
+                                      <p:cBhvr>
+                                        <p:cTn id="6" dur="26544" fill="hold"/>
+                                        <p:tgtEl>
+                                          <p:spTgt spid="3"/>
+                                        </p:tgtEl>
+                                      </p:cBhvr>
+                                    </p:cmd>
+                                  </p:childTnLst>
+                                </p:cTn>
+                              </p:par>
+                            </p:childTnLst>
+                          </p:cTn>
+                        </p:par>
+                      </p:childTnLst>
+                    </p:cTn>
+                  </p:par>
+                </p:childTnLst>
+              </p:cTn>
+              <p:prevCondLst>
+                <p:cond evt="onPrev" delay="0">
+                  <p:tgtEl>
+                    <p:sldTgt/>
+                  </p:tgtEl>
+                </p:cond>
+              </p:prevCondLst>
+              <p:nextCondLst>
+                <p:cond evt="onNext" delay="0">
+                  <p:tgtEl>
+                    <p:sldTgt/>
+                  </p:tgtEl>
+                </p:cond>
+              </p:nextCondLst>
+            </p:seq>
+            <p:audio>
+              <p:cMediaNode vol="80000">
+                <p:cTn id="7" fill="hold" display="0">
+                  <p:stCondLst>
+                    <p:cond delay="indefinite"/>
+                  </p:stCondLst>
+                  <p:endCondLst>
+                    <p:cond evt="onStopAudio" delay="0">
+                      <p:tgtEl>
+                        <p:sldTgt/>
+                      </p:tgtEl>
+                    </p:cond>
+                  </p:endCondLst>
+                </p:cTn>
+                <p:tgtEl>
+                  <p:spTgt spid="3"/>
+                </p:tgtEl>
+              </p:cMediaNode>
+            </p:audio>
+          </p:childTnLst>
+        </p:cTn>
+      </p:par>
+    </p:tnLst>
+  </p:timing>
 </p:sld>
 </file>
 
-<file path=ppt/slides/slide5.xml><?xml version="1.0" encoding="utf-8"?>
+<file path=ppt/slides/slide6.xml><?xml version="1.0" encoding="utf-8"?>
 <p:sld xmlns:a="http://schemas.openxmlformats.org/drawingml/2006/main" xmlns:r="http://schemas.openxmlformats.org/officeDocument/2006/relationships" xmlns:p="http://schemas.openxmlformats.org/presentationml/2006/main">
   <p:cSld>
     <p:bg>
@@ -12443,15 +16199,137 @@
           </a:p>
         </p:txBody>
       </p:sp>
+      <p:pic>
+        <p:nvPicPr>
+          <p:cNvPr id="5" name="slide_6_narration_v2">
+            <a:hlinkClick r:id="" action="ppaction://media"/>
+            <a:extLst>
+              <a:ext uri="{FF2B5EF4-FFF2-40B4-BE49-F238E27FC236}">
+                <a16:creationId xmlns:a16="http://schemas.microsoft.com/office/drawing/2014/main" id="{90F47929-C2E0-5857-6B88-36612BC851B0}"/>
+              </a:ext>
+            </a:extLst>
+          </p:cNvPr>
+          <p:cNvPicPr>
+            <a:picLocks noChangeAspect="1"/>
+          </p:cNvPicPr>
+          <p:nvPr>
+            <a:audioFile r:link="rId2"/>
+            <p:extLst>
+              <p:ext uri="{DAA4B4D4-6D71-4841-9C94-3DE7FCFB9230}">
+                <p14:media xmlns:p14="http://schemas.microsoft.com/office/powerpoint/2010/main" r:embed="rId1"/>
+              </p:ext>
+            </p:extLst>
+          </p:nvPr>
+        </p:nvPicPr>
+        <p:blipFill>
+          <a:blip r:embed="rId5"/>
+          <a:stretch>
+            <a:fillRect/>
+          </a:stretch>
+        </p:blipFill>
+        <p:spPr>
+          <a:xfrm>
+            <a:off x="8492529" y="257007"/>
+            <a:ext cx="304800" cy="304800"/>
+          </a:xfrm>
+          <a:prstGeom prst="rect">
+            <a:avLst/>
+          </a:prstGeom>
+        </p:spPr>
+      </p:pic>
     </p:spTree>
   </p:cSld>
   <p:clrMapOvr>
     <a:masterClrMapping/>
   </p:clrMapOvr>
+  <p:timing>
+    <p:tnLst>
+      <p:par>
+        <p:cTn id="1" dur="indefinite" restart="never" nodeType="tmRoot">
+          <p:childTnLst>
+            <p:seq concurrent="1" nextAc="seek">
+              <p:cTn id="2" dur="indefinite" nodeType="mainSeq">
+                <p:childTnLst>
+                  <p:par>
+                    <p:cTn id="3" fill="hold">
+                      <p:stCondLst>
+                        <p:cond delay="indefinite"/>
+                      </p:stCondLst>
+                      <p:childTnLst>
+                        <p:par>
+                          <p:cTn id="4" fill="hold">
+                            <p:stCondLst>
+                              <p:cond delay="0"/>
+                            </p:stCondLst>
+                            <p:childTnLst>
+                              <p:par>
+                                <p:cTn id="5" presetID="1" presetClass="mediacall" presetSubtype="0" fill="hold" nodeType="clickEffect">
+                                  <p:stCondLst>
+                                    <p:cond delay="0"/>
+                                  </p:stCondLst>
+                                  <p:childTnLst>
+                                    <p:cmd type="call" cmd="playFrom(0.0)">
+                                      <p:cBhvr>
+                                        <p:cTn id="6" dur="33600" fill="hold"/>
+                                        <p:tgtEl>
+                                          <p:spTgt spid="5"/>
+                                        </p:tgtEl>
+                                      </p:cBhvr>
+                                    </p:cmd>
+                                  </p:childTnLst>
+                                </p:cTn>
+                              </p:par>
+                            </p:childTnLst>
+                          </p:cTn>
+                        </p:par>
+                      </p:childTnLst>
+                    </p:cTn>
+                  </p:par>
+                </p:childTnLst>
+              </p:cTn>
+              <p:prevCondLst>
+                <p:cond evt="onPrev" delay="0">
+                  <p:tgtEl>
+                    <p:sldTgt/>
+                  </p:tgtEl>
+                </p:cond>
+              </p:prevCondLst>
+              <p:nextCondLst>
+                <p:cond evt="onNext" delay="0">
+                  <p:tgtEl>
+                    <p:sldTgt/>
+                  </p:tgtEl>
+                </p:cond>
+              </p:nextCondLst>
+            </p:seq>
+            <p:audio>
+              <p:cMediaNode vol="80000">
+                <p:cTn id="7" fill="hold" display="0">
+                  <p:stCondLst>
+                    <p:cond delay="indefinite"/>
+                  </p:stCondLst>
+                  <p:endCondLst>
+                    <p:cond evt="onStopAudio" delay="0">
+                      <p:tgtEl>
+                        <p:sldTgt/>
+                      </p:tgtEl>
+                    </p:cond>
+                  </p:endCondLst>
+                </p:cTn>
+                <p:tgtEl>
+                  <p:spTgt spid="5"/>
+                </p:tgtEl>
+              </p:cMediaNode>
+            </p:audio>
+          </p:childTnLst>
+        </p:cTn>
+      </p:par>
+    </p:tnLst>
+  </p:timing>
 </p:sld>
 </file>
 
-<file path=ppt/slides/slide6.xml><?xml version="1.0" encoding="utf-8"?>
+<file path=ppt/slides/slide7.xml><?xml version="1.0" encoding="utf-8"?>
 <p:sld xmlns:a="http://schemas.openxmlformats.org/drawingml/2006/main" xmlns:r="http://schemas.openxmlformats.org/officeDocument/2006/relationships" xmlns:p="http://schemas.openxmlformats.org/presentationml/2006/main">
   <p:cSld>
     <p:bg>
@@ -12843,7 +16721,7 @@
           </p:nvPr>
         </p:nvPicPr>
         <p:blipFill>
-          <a:blip r:embed="rId2"/>
+          <a:blip r:embed="rId4"/>
           <a:stretch>
             <a:fillRect/>
           </a:stretch>
@@ -12852,6 +16730,44 @@
           <a:xfrm>
             <a:off x="324168" y="2036598"/>
             <a:ext cx="8495662" cy="4311550"/>
+          </a:xfrm>
+          <a:prstGeom prst="rect">
+            <a:avLst/>
+          </a:prstGeom>
+        </p:spPr>
+      </p:pic>
+      <p:pic>
+        <p:nvPicPr>
+          <p:cNvPr id="3" name="slide_7_narration_v2">
+            <a:hlinkClick r:id="" action="ppaction://media"/>
+            <a:extLst>
+              <a:ext uri="{FF2B5EF4-FFF2-40B4-BE49-F238E27FC236}">
+                <a16:creationId xmlns:a16="http://schemas.microsoft.com/office/drawing/2014/main" id="{E6B96822-C674-5081-718A-DFC331EBFBB2}"/>
+              </a:ext>
+            </a:extLst>
+          </p:cNvPr>
+          <p:cNvPicPr>
+            <a:picLocks noChangeAspect="1"/>
+          </p:cNvPicPr>
+          <p:nvPr>
+            <a:audioFile r:link="rId2"/>
+            <p:extLst>
+              <p:ext uri="{DAA4B4D4-6D71-4841-9C94-3DE7FCFB9230}">
+                <p14:media xmlns:p14="http://schemas.microsoft.com/office/powerpoint/2010/main" r:embed="rId1"/>
+              </p:ext>
+            </p:extLst>
+          </p:nvPr>
+        </p:nvPicPr>
+        <p:blipFill>
+          <a:blip r:embed="rId5"/>
+          <a:stretch>
+            <a:fillRect/>
+          </a:stretch>
+        </p:blipFill>
+        <p:spPr>
+          <a:xfrm>
+            <a:off x="8619216" y="264064"/>
+            <a:ext cx="304800" cy="304800"/>
           </a:xfrm>
           <a:prstGeom prst="rect">
             <a:avLst/>
@@ -12868,6 +16784,90 @@
   <p:clrMapOvr>
     <a:masterClrMapping/>
   </p:clrMapOvr>
+  <p:timing>
+    <p:tnLst>
+      <p:par>
+        <p:cTn id="1" dur="indefinite" restart="never" nodeType="tmRoot">
+          <p:childTnLst>
+            <p:seq concurrent="1" nextAc="seek">
+              <p:cTn id="2" dur="indefinite" nodeType="mainSeq">
+                <p:childTnLst>
+                  <p:par>
+                    <p:cTn id="3" fill="hold">
+                      <p:stCondLst>
+                        <p:cond delay="indefinite"/>
+                      </p:stCondLst>
+                      <p:childTnLst>
+                        <p:par>
+                          <p:cTn id="4" fill="hold">
+                            <p:stCondLst>
+                              <p:cond delay="0"/>
+                            </p:stCondLst>
+                            <p:childTnLst>
+                              <p:par>
+                                <p:cTn id="5" presetID="1" presetClass="mediacall" presetSubtype="0" fill="hold" nodeType="clickEffect">
+                                  <p:stCondLst>
+                                    <p:cond delay="0"/>
+                                  </p:stCondLst>
+                                  <p:childTnLst>
+                                    <p:cmd type="call" cmd="playFrom(0.0)">
+                                      <p:cBhvr>
+                                        <p:cTn id="6" dur="12216" fill="hold"/>
+                                        <p:tgtEl>
+                                          <p:spTgt spid="3"/>
+                                        </p:tgtEl>
+                                      </p:cBhvr>
+                                    </p:cmd>
+                                  </p:childTnLst>
+                                </p:cTn>
+                              </p:par>
+                            </p:childTnLst>
+                          </p:cTn>
+                        </p:par>
+                      </p:childTnLst>
+                    </p:cTn>
+                  </p:par>
+                </p:childTnLst>
+              </p:cTn>
+              <p:prevCondLst>
+                <p:cond evt="onPrev" delay="0">
+                  <p:tgtEl>
+                    <p:sldTgt/>
+                  </p:tgtEl>
+                </p:cond>
+              </p:prevCondLst>
+              <p:nextCondLst>
+                <p:cond evt="onNext" delay="0">
+                  <p:tgtEl>
+                    <p:sldTgt/>
+                  </p:tgtEl>
+                </p:cond>
+              </p:nextCondLst>
+            </p:seq>
+            <p:audio>
+              <p:cMediaNode vol="80000">
+                <p:cTn id="7" fill="hold" display="0">
+                  <p:stCondLst>
+                    <p:cond delay="indefinite"/>
+                  </p:stCondLst>
+                  <p:endCondLst>
+                    <p:cond evt="onStopAudio" delay="0">
+                      <p:tgtEl>
+                        <p:sldTgt/>
+                      </p:tgtEl>
+                    </p:cond>
+                  </p:endCondLst>
+                </p:cTn>
+                <p:tgtEl>
+                  <p:spTgt spid="3"/>
+                </p:tgtEl>
+              </p:cMediaNode>
+            </p:audio>
+          </p:childTnLst>
+        </p:cTn>
+      </p:par>
+    </p:tnLst>
+  </p:timing>
 </p:sld>
 </file>
 

</xml_diff>